<commit_message>
changed: presentazione con codice
</commit_message>
<xml_diff>
--- a/esercitazione_8/documents/Esercitazione 8.pptx
+++ b/esercitazione_8/documents/Esercitazione 8.pptx
@@ -1,21 +1,20 @@
 
 <file path=ppt/presentation.xml><?xml version="1.0" encoding="utf-8"?>
-<p:presentation xmlns:a="http://schemas.openxmlformats.org/drawingml/2006/main" xmlns:r="http://schemas.openxmlformats.org/officeDocument/2006/relationships" xmlns:p="http://schemas.openxmlformats.org/presentationml/2006/main" xmlns:m="http://schemas.openxmlformats.org/officeDocument/2006/math" xmlns:a14="http://schemas.microsoft.com/office/drawing/2010/main">
+<p:presentation xmlns:a="http://schemas.openxmlformats.org/drawingml/2006/main" xmlns:r="http://schemas.openxmlformats.org/officeDocument/2006/relationships" xmlns:p="http://schemas.openxmlformats.org/presentationml/2006/main">
   <p:sldMasterIdLst>
-    <p:sldMasterId id="2147483648" r:id="rId5"/>
+    <p:sldMasterId id="2147483648" r:id="rId1"/>
   </p:sldMasterIdLst>
   <p:notesMasterIdLst>
-    <p:notesMasterId r:id="rId7"/>
+    <p:notesMasterId r:id="rId9"/>
   </p:notesMasterIdLst>
   <p:sldIdLst>
-    <p:sldId id="256" r:id="rId8"/>
-    <p:sldId id="257" r:id="rId9"/>
-    <p:sldId id="258" r:id="rId10"/>
-    <p:sldId id="259" r:id="rId11"/>
-    <p:sldId id="260" r:id="rId12"/>
-    <p:sldId id="261" r:id="rId13"/>
-    <p:sldId id="262" r:id="rId14"/>
-    <p:sldId id="263" r:id="rId15"/>
+    <p:sldId id="256" r:id="rId2"/>
+    <p:sldId id="257" r:id="rId3"/>
+    <p:sldId id="258" r:id="rId4"/>
+    <p:sldId id="259" r:id="rId5"/>
+    <p:sldId id="260" r:id="rId6"/>
+    <p:sldId id="262" r:id="rId7"/>
+    <p:sldId id="263" r:id="rId8"/>
   </p:sldIdLst>
   <p:sldSz cx="18288000" cy="10287000"/>
   <p:notesSz cx="6858000" cy="9144000"/>
@@ -35,7 +34,7 @@
       <a:buFontTx/>
       <a:buNone/>
       <a:tabLst/>
-      <a:defRPr b="0" baseline="0" cap="none" i="0" spc="0" strike="noStrike" sz="1800" u="none" kumimoji="0" normalizeH="0">
+      <a:defRPr kumimoji="0" sz="1800" b="0" i="0" u="none" strike="noStrike" cap="none" spc="0" normalizeH="0" baseline="0">
         <a:ln>
           <a:noFill/>
         </a:ln>
@@ -61,7 +60,7 @@
       <a:buFontTx/>
       <a:buNone/>
       <a:tabLst/>
-      <a:defRPr b="0" baseline="0" cap="none" i="0" spc="0" strike="noStrike" sz="1800" u="none" kumimoji="0" normalizeH="0">
+      <a:defRPr kumimoji="0" sz="1800" b="0" i="0" u="none" strike="noStrike" cap="none" spc="0" normalizeH="0" baseline="0">
         <a:ln>
           <a:noFill/>
         </a:ln>
@@ -91,7 +90,7 @@
       <a:buFontTx/>
       <a:buNone/>
       <a:tabLst/>
-      <a:defRPr b="0" baseline="0" cap="none" i="0" spc="0" strike="noStrike" sz="1800" u="none" kumimoji="0" normalizeH="0">
+      <a:defRPr kumimoji="0" sz="1800" b="0" i="0" u="none" strike="noStrike" cap="none" spc="0" normalizeH="0" baseline="0">
         <a:ln>
           <a:noFill/>
         </a:ln>
@@ -121,7 +120,7 @@
       <a:buFontTx/>
       <a:buNone/>
       <a:tabLst/>
-      <a:defRPr b="0" baseline="0" cap="none" i="0" spc="0" strike="noStrike" sz="1800" u="none" kumimoji="0" normalizeH="0">
+      <a:defRPr kumimoji="0" sz="1800" b="0" i="0" u="none" strike="noStrike" cap="none" spc="0" normalizeH="0" baseline="0">
         <a:ln>
           <a:noFill/>
         </a:ln>
@@ -151,7 +150,7 @@
       <a:buFontTx/>
       <a:buNone/>
       <a:tabLst/>
-      <a:defRPr b="0" baseline="0" cap="none" i="0" spc="0" strike="noStrike" sz="1800" u="none" kumimoji="0" normalizeH="0">
+      <a:defRPr kumimoji="0" sz="1800" b="0" i="0" u="none" strike="noStrike" cap="none" spc="0" normalizeH="0" baseline="0">
         <a:ln>
           <a:noFill/>
         </a:ln>
@@ -181,7 +180,7 @@
       <a:buFontTx/>
       <a:buNone/>
       <a:tabLst/>
-      <a:defRPr b="0" baseline="0" cap="none" i="0" spc="0" strike="noStrike" sz="1800" u="none" kumimoji="0" normalizeH="0">
+      <a:defRPr kumimoji="0" sz="1800" b="0" i="0" u="none" strike="noStrike" cap="none" spc="0" normalizeH="0" baseline="0">
         <a:ln>
           <a:noFill/>
         </a:ln>
@@ -211,7 +210,7 @@
       <a:buFontTx/>
       <a:buNone/>
       <a:tabLst/>
-      <a:defRPr b="0" baseline="0" cap="none" i="0" spc="0" strike="noStrike" sz="1800" u="none" kumimoji="0" normalizeH="0">
+      <a:defRPr kumimoji="0" sz="1800" b="0" i="0" u="none" strike="noStrike" cap="none" spc="0" normalizeH="0" baseline="0">
         <a:ln>
           <a:noFill/>
         </a:ln>
@@ -241,7 +240,7 @@
       <a:buFontTx/>
       <a:buNone/>
       <a:tabLst/>
-      <a:defRPr b="0" baseline="0" cap="none" i="0" spc="0" strike="noStrike" sz="1800" u="none" kumimoji="0" normalizeH="0">
+      <a:defRPr kumimoji="0" sz="1800" b="0" i="0" u="none" strike="noStrike" cap="none" spc="0" normalizeH="0" baseline="0">
         <a:ln>
           <a:noFill/>
         </a:ln>
@@ -271,7 +270,7 @@
       <a:buFontTx/>
       <a:buNone/>
       <a:tabLst/>
-      <a:defRPr b="0" baseline="0" cap="none" i="0" spc="0" strike="noStrike" sz="1800" u="none" kumimoji="0" normalizeH="0">
+      <a:defRPr kumimoji="0" sz="1800" b="0" i="0" u="none" strike="noStrike" cap="none" spc="0" normalizeH="0" baseline="0">
         <a:ln>
           <a:noFill/>
         </a:ln>
@@ -301,7 +300,7 @@
       <a:buFontTx/>
       <a:buNone/>
       <a:tabLst/>
-      <a:defRPr b="0" baseline="0" cap="none" i="0" spc="0" strike="noStrike" sz="1800" u="none" kumimoji="0" normalizeH="0">
+      <a:defRPr kumimoji="0" sz="1800" b="0" i="0" u="none" strike="noStrike" cap="none" spc="0" normalizeH="0" baseline="0">
         <a:ln>
           <a:noFill/>
         </a:ln>
@@ -320,13 +319,22 @@
 </p:presentation>
 </file>
 
-<file path=ppt/commentAuthors.xml><?xml version="1.0" encoding="utf-8"?>
-<p:cmAuthorLst xmlns:a="http://schemas.openxmlformats.org/drawingml/2006/main" xmlns:r="http://schemas.openxmlformats.org/officeDocument/2006/relationships" xmlns:p="http://schemas.openxmlformats.org/presentationml/2006/main" xmlns:m="http://schemas.openxmlformats.org/officeDocument/2006/math" xmlns:a14="http://schemas.microsoft.com/office/drawing/2010/main"/>
+<file path=ppt/revisionInfo.xml><?xml version="1.0" encoding="utf-8"?>
+<p1510:revInfo xmlns:a="http://schemas.openxmlformats.org/drawingml/2006/main" xmlns:r="http://schemas.openxmlformats.org/officeDocument/2006/relationships" xmlns:p1510="http://schemas.microsoft.com/office/powerpoint/2015/10/main">
+  <p1510:revLst>
+    <p1510:client id="{6B339AB1-7177-6CDE-020A-812F2EFEEB91}" v="111" dt="2021-12-07T09:32:36.877"/>
+  </p1510:revLst>
+</p1510:revInfo>
 </file>
 
 <file path=ppt/notesMasters/notesMaster1.xml><?xml version="1.0" encoding="utf-8"?>
-<p:notesMaster xmlns:a="http://schemas.openxmlformats.org/drawingml/2006/main" xmlns:r="http://schemas.openxmlformats.org/officeDocument/2006/relationships" xmlns:p="http://schemas.openxmlformats.org/presentationml/2006/main" xmlns:m="http://schemas.openxmlformats.org/officeDocument/2006/math" xmlns:a14="http://schemas.microsoft.com/office/drawing/2010/main">
+<p:notesMaster xmlns:a="http://schemas.openxmlformats.org/drawingml/2006/main" xmlns:r="http://schemas.openxmlformats.org/officeDocument/2006/relationships" xmlns:p="http://schemas.openxmlformats.org/presentationml/2006/main">
   <p:cSld>
+    <p:bg>
+      <p:bgRef idx="1001">
+        <a:schemeClr val="bg1"/>
+      </p:bgRef>
+    </p:bg>
     <p:spTree>
       <p:nvGrpSpPr>
         <p:cNvPr id="1" name=""/>
@@ -344,7 +352,9 @@
       <p:sp>
         <p:nvSpPr>
           <p:cNvPr id="91" name="Shape 91"/>
-          <p:cNvSpPr/>
+          <p:cNvSpPr>
+            <a:spLocks noGrp="1" noRot="1" noChangeAspect="1"/>
+          </p:cNvSpPr>
           <p:nvPr>
             <p:ph type="sldImg"/>
           </p:nvPr>
@@ -362,14 +372,16 @@
           <a:bodyPr/>
           <a:lstStyle/>
           <a:p>
-            <a:pPr/>
+            <a:endParaRPr/>
           </a:p>
         </p:txBody>
       </p:sp>
       <p:sp>
         <p:nvSpPr>
           <p:cNvPr id="92" name="Shape 92"/>
-          <p:cNvSpPr/>
+          <p:cNvSpPr>
+            <a:spLocks noGrp="1"/>
+          </p:cNvSpPr>
           <p:nvPr>
             <p:ph type="body" sz="quarter" idx="1"/>
           </p:nvPr>
@@ -387,7 +399,7 @@
           <a:bodyPr/>
           <a:lstStyle/>
           <a:p>
-            <a:pPr/>
+            <a:endParaRPr/>
           </a:p>
         </p:txBody>
       </p:sp>
@@ -472,7 +484,7 @@
 </file>
 
 <file path=ppt/slideLayouts/slideLayout1.xml><?xml version="1.0" encoding="utf-8"?>
-<p:sldLayout xmlns:a="http://schemas.openxmlformats.org/drawingml/2006/main" xmlns:r="http://schemas.openxmlformats.org/officeDocument/2006/relationships" xmlns:p="http://schemas.openxmlformats.org/presentationml/2006/main" xmlns:m="http://schemas.openxmlformats.org/officeDocument/2006/math" xmlns:a14="http://schemas.microsoft.com/office/drawing/2010/main" type="title" showMasterSp="1" showMasterPhAnim="1">
+<p:sldLayout xmlns:a="http://schemas.openxmlformats.org/drawingml/2006/main" xmlns:r="http://schemas.openxmlformats.org/officeDocument/2006/relationships" xmlns:p="http://schemas.openxmlformats.org/presentationml/2006/main" type="title">
   <p:cSld name="Title Slide">
     <p:spTree>
       <p:nvGrpSpPr>
@@ -491,7 +503,9 @@
       <p:sp>
         <p:nvSpPr>
           <p:cNvPr id="11" name="Titolo Testo"/>
-          <p:cNvSpPr txBox="1"/>
+          <p:cNvSpPr txBox="1">
+            <a:spLocks noGrp="1"/>
+          </p:cNvSpPr>
           <p:nvPr>
             <p:ph type="title"/>
           </p:nvPr>
@@ -509,7 +523,6 @@
           <a:bodyPr/>
           <a:lstStyle/>
           <a:p>
-            <a:pPr/>
             <a:r>
               <a:t>Titolo Testo</a:t>
             </a:r>
@@ -519,7 +532,9 @@
       <p:sp>
         <p:nvSpPr>
           <p:cNvPr id="12" name="Corpo livello uno…"/>
-          <p:cNvSpPr txBox="1"/>
+          <p:cNvSpPr txBox="1">
+            <a:spLocks noGrp="1"/>
+          </p:cNvSpPr>
           <p:nvPr>
             <p:ph type="body" sz="quarter" idx="1"/>
           </p:nvPr>
@@ -588,7 +603,6 @@
             </a:lvl5pPr>
           </a:lstStyle>
           <a:p>
-            <a:pPr/>
             <a:r>
               <a:t>Corpo livello uno</a:t>
             </a:r>
@@ -622,7 +636,9 @@
       <p:sp>
         <p:nvSpPr>
           <p:cNvPr id="13" name="Numero diapositiva"/>
-          <p:cNvSpPr txBox="1"/>
+          <p:cNvSpPr txBox="1">
+            <a:spLocks noGrp="1"/>
+          </p:cNvSpPr>
           <p:nvPr>
             <p:ph type="sldNum" sz="quarter" idx="2"/>
           </p:nvPr>
@@ -636,8 +652,10 @@
           <a:bodyPr/>
           <a:lstStyle/>
           <a:p>
-            <a:pPr/>
-            <a:fld id="{86CB4B4D-7CA3-9044-876B-883B54F8677D}" type="slidenum"/>
+            <a:fld id="{86CB4B4D-7CA3-9044-876B-883B54F8677D}" type="slidenum">
+              <a:t>‹#›</a:t>
+            </a:fld>
+            <a:endParaRPr/>
           </a:p>
         </p:txBody>
       </p:sp>
@@ -646,12 +664,12 @@
   <p:clrMapOvr>
     <a:masterClrMapping/>
   </p:clrMapOvr>
-  <p:transition xmlns:p14="http://schemas.microsoft.com/office/powerpoint/2010/main" spd="med" advClick="1"/>
+  <p:transition spd="med"/>
 </p:sldLayout>
 </file>
 
 <file path=ppt/slideLayouts/slideLayout2.xml><?xml version="1.0" encoding="utf-8"?>
-<p:sldLayout xmlns:a="http://schemas.openxmlformats.org/drawingml/2006/main" xmlns:r="http://schemas.openxmlformats.org/officeDocument/2006/relationships" xmlns:p="http://schemas.openxmlformats.org/presentationml/2006/main" xmlns:m="http://schemas.openxmlformats.org/officeDocument/2006/math" xmlns:a14="http://schemas.microsoft.com/office/drawing/2010/main" type="tx" showMasterSp="1" showMasterPhAnim="1">
+<p:sldLayout xmlns:a="http://schemas.openxmlformats.org/drawingml/2006/main" xmlns:r="http://schemas.openxmlformats.org/officeDocument/2006/relationships" xmlns:p="http://schemas.openxmlformats.org/presentationml/2006/main" type="tx">
   <p:cSld name="Title and Content">
     <p:spTree>
       <p:nvGrpSpPr>
@@ -670,7 +688,9 @@
       <p:sp>
         <p:nvSpPr>
           <p:cNvPr id="20" name="Titolo Testo"/>
-          <p:cNvSpPr txBox="1"/>
+          <p:cNvSpPr txBox="1">
+            <a:spLocks noGrp="1"/>
+          </p:cNvSpPr>
           <p:nvPr>
             <p:ph type="title"/>
           </p:nvPr>
@@ -688,7 +708,6 @@
           <a:bodyPr/>
           <a:lstStyle/>
           <a:p>
-            <a:pPr/>
             <a:r>
               <a:t>Titolo Testo</a:t>
             </a:r>
@@ -698,7 +717,9 @@
       <p:sp>
         <p:nvSpPr>
           <p:cNvPr id="21" name="Corpo livello uno…"/>
-          <p:cNvSpPr txBox="1"/>
+          <p:cNvSpPr txBox="1">
+            <a:spLocks noGrp="1"/>
+          </p:cNvSpPr>
           <p:nvPr>
             <p:ph type="body" sz="quarter" idx="1"/>
           </p:nvPr>
@@ -716,7 +737,6 @@
           <a:bodyPr/>
           <a:lstStyle/>
           <a:p>
-            <a:pPr/>
             <a:r>
               <a:t>Corpo livello uno</a:t>
             </a:r>
@@ -750,7 +770,9 @@
       <p:sp>
         <p:nvSpPr>
           <p:cNvPr id="22" name="Numero diapositiva"/>
-          <p:cNvSpPr txBox="1"/>
+          <p:cNvSpPr txBox="1">
+            <a:spLocks noGrp="1"/>
+          </p:cNvSpPr>
           <p:nvPr>
             <p:ph type="sldNum" sz="quarter" idx="2"/>
           </p:nvPr>
@@ -764,8 +786,10 @@
           <a:bodyPr/>
           <a:lstStyle/>
           <a:p>
-            <a:pPr/>
-            <a:fld id="{86CB4B4D-7CA3-9044-876B-883B54F8677D}" type="slidenum"/>
+            <a:fld id="{86CB4B4D-7CA3-9044-876B-883B54F8677D}" type="slidenum">
+              <a:t>‹#›</a:t>
+            </a:fld>
+            <a:endParaRPr/>
           </a:p>
         </p:txBody>
       </p:sp>
@@ -774,12 +798,12 @@
   <p:clrMapOvr>
     <a:masterClrMapping/>
   </p:clrMapOvr>
-  <p:transition xmlns:p14="http://schemas.microsoft.com/office/powerpoint/2010/main" spd="med" advClick="1"/>
+  <p:transition spd="med"/>
 </p:sldLayout>
 </file>
 
 <file path=ppt/slideLayouts/slideLayout3.xml><?xml version="1.0" encoding="utf-8"?>
-<p:sldLayout xmlns:a="http://schemas.openxmlformats.org/drawingml/2006/main" xmlns:r="http://schemas.openxmlformats.org/officeDocument/2006/relationships" xmlns:p="http://schemas.openxmlformats.org/presentationml/2006/main" xmlns:m="http://schemas.openxmlformats.org/officeDocument/2006/math" xmlns:a14="http://schemas.microsoft.com/office/drawing/2010/main" type="tx" showMasterSp="1" showMasterPhAnim="1">
+<p:sldLayout xmlns:a="http://schemas.openxmlformats.org/drawingml/2006/main" xmlns:r="http://schemas.openxmlformats.org/officeDocument/2006/relationships" xmlns:p="http://schemas.openxmlformats.org/presentationml/2006/main" type="tx">
   <p:cSld name="Section Header">
     <p:spTree>
       <p:nvGrpSpPr>
@@ -798,7 +822,9 @@
       <p:sp>
         <p:nvSpPr>
           <p:cNvPr id="29" name="Titolo Testo"/>
-          <p:cNvSpPr txBox="1"/>
+          <p:cNvSpPr txBox="1">
+            <a:spLocks noGrp="1"/>
+          </p:cNvSpPr>
           <p:nvPr>
             <p:ph type="title"/>
           </p:nvPr>
@@ -816,11 +842,10 @@
           <a:bodyPr anchor="t"/>
           <a:lstStyle>
             <a:lvl1pPr algn="l">
-              <a:defRPr b="1" cap="all" sz="4000"/>
+              <a:defRPr sz="4000" b="1" cap="all"/>
             </a:lvl1pPr>
           </a:lstStyle>
           <a:p>
-            <a:pPr/>
             <a:r>
               <a:t>Titolo Testo</a:t>
             </a:r>
@@ -830,7 +855,9 @@
       <p:sp>
         <p:nvSpPr>
           <p:cNvPr id="30" name="Corpo livello uno…"/>
-          <p:cNvSpPr txBox="1"/>
+          <p:cNvSpPr txBox="1">
+            <a:spLocks noGrp="1"/>
+          </p:cNvSpPr>
           <p:nvPr>
             <p:ph type="body" sz="quarter" idx="1"/>
           </p:nvPr>
@@ -914,7 +941,6 @@
             </a:lvl5pPr>
           </a:lstStyle>
           <a:p>
-            <a:pPr/>
             <a:r>
               <a:t>Corpo livello uno</a:t>
             </a:r>
@@ -948,7 +974,9 @@
       <p:sp>
         <p:nvSpPr>
           <p:cNvPr id="31" name="Numero diapositiva"/>
-          <p:cNvSpPr txBox="1"/>
+          <p:cNvSpPr txBox="1">
+            <a:spLocks noGrp="1"/>
+          </p:cNvSpPr>
           <p:nvPr>
             <p:ph type="sldNum" sz="quarter" idx="2"/>
           </p:nvPr>
@@ -962,8 +990,10 @@
           <a:bodyPr/>
           <a:lstStyle/>
           <a:p>
-            <a:pPr/>
-            <a:fld id="{86CB4B4D-7CA3-9044-876B-883B54F8677D}" type="slidenum"/>
+            <a:fld id="{86CB4B4D-7CA3-9044-876B-883B54F8677D}" type="slidenum">
+              <a:t>‹#›</a:t>
+            </a:fld>
+            <a:endParaRPr/>
           </a:p>
         </p:txBody>
       </p:sp>
@@ -972,12 +1002,12 @@
   <p:clrMapOvr>
     <a:masterClrMapping/>
   </p:clrMapOvr>
-  <p:transition xmlns:p14="http://schemas.microsoft.com/office/powerpoint/2010/main" spd="med" advClick="1"/>
+  <p:transition spd="med"/>
 </p:sldLayout>
 </file>
 
 <file path=ppt/slideLayouts/slideLayout4.xml><?xml version="1.0" encoding="utf-8"?>
-<p:sldLayout xmlns:a="http://schemas.openxmlformats.org/drawingml/2006/main" xmlns:r="http://schemas.openxmlformats.org/officeDocument/2006/relationships" xmlns:p="http://schemas.openxmlformats.org/presentationml/2006/main" xmlns:m="http://schemas.openxmlformats.org/officeDocument/2006/math" xmlns:a14="http://schemas.microsoft.com/office/drawing/2010/main" type="tx" showMasterSp="1" showMasterPhAnim="1">
+<p:sldLayout xmlns:a="http://schemas.openxmlformats.org/drawingml/2006/main" xmlns:r="http://schemas.openxmlformats.org/officeDocument/2006/relationships" xmlns:p="http://schemas.openxmlformats.org/presentationml/2006/main" type="tx">
   <p:cSld name="Two Content">
     <p:spTree>
       <p:nvGrpSpPr>
@@ -996,7 +1026,9 @@
       <p:sp>
         <p:nvSpPr>
           <p:cNvPr id="38" name="Titolo Testo"/>
-          <p:cNvSpPr txBox="1"/>
+          <p:cNvSpPr txBox="1">
+            <a:spLocks noGrp="1"/>
+          </p:cNvSpPr>
           <p:nvPr>
             <p:ph type="title"/>
           </p:nvPr>
@@ -1014,7 +1046,6 @@
           <a:bodyPr/>
           <a:lstStyle/>
           <a:p>
-            <a:pPr/>
             <a:r>
               <a:t>Titolo Testo</a:t>
             </a:r>
@@ -1024,7 +1055,9 @@
       <p:sp>
         <p:nvSpPr>
           <p:cNvPr id="39" name="Corpo livello uno…"/>
-          <p:cNvSpPr txBox="1"/>
+          <p:cNvSpPr txBox="1">
+            <a:spLocks noGrp="1"/>
+          </p:cNvSpPr>
           <p:nvPr>
             <p:ph type="body" sz="quarter" idx="1"/>
           </p:nvPr>
@@ -1073,7 +1106,6 @@
             </a:lvl5pPr>
           </a:lstStyle>
           <a:p>
-            <a:pPr/>
             <a:r>
               <a:t>Corpo livello uno</a:t>
             </a:r>
@@ -1107,7 +1139,9 @@
       <p:sp>
         <p:nvSpPr>
           <p:cNvPr id="40" name="Numero diapositiva"/>
-          <p:cNvSpPr txBox="1"/>
+          <p:cNvSpPr txBox="1">
+            <a:spLocks noGrp="1"/>
+          </p:cNvSpPr>
           <p:nvPr>
             <p:ph type="sldNum" sz="quarter" idx="2"/>
           </p:nvPr>
@@ -1121,8 +1155,10 @@
           <a:bodyPr/>
           <a:lstStyle/>
           <a:p>
-            <a:pPr/>
-            <a:fld id="{86CB4B4D-7CA3-9044-876B-883B54F8677D}" type="slidenum"/>
+            <a:fld id="{86CB4B4D-7CA3-9044-876B-883B54F8677D}" type="slidenum">
+              <a:t>‹#›</a:t>
+            </a:fld>
+            <a:endParaRPr/>
           </a:p>
         </p:txBody>
       </p:sp>
@@ -1131,12 +1167,12 @@
   <p:clrMapOvr>
     <a:masterClrMapping/>
   </p:clrMapOvr>
-  <p:transition xmlns:p14="http://schemas.microsoft.com/office/powerpoint/2010/main" spd="med" advClick="1"/>
+  <p:transition spd="med"/>
 </p:sldLayout>
 </file>
 
 <file path=ppt/slideLayouts/slideLayout5.xml><?xml version="1.0" encoding="utf-8"?>
-<p:sldLayout xmlns:a="http://schemas.openxmlformats.org/drawingml/2006/main" xmlns:r="http://schemas.openxmlformats.org/officeDocument/2006/relationships" xmlns:p="http://schemas.openxmlformats.org/presentationml/2006/main" xmlns:m="http://schemas.openxmlformats.org/officeDocument/2006/math" xmlns:a14="http://schemas.microsoft.com/office/drawing/2010/main" type="tx" showMasterSp="1" showMasterPhAnim="1">
+<p:sldLayout xmlns:a="http://schemas.openxmlformats.org/drawingml/2006/main" xmlns:r="http://schemas.openxmlformats.org/officeDocument/2006/relationships" xmlns:p="http://schemas.openxmlformats.org/presentationml/2006/main" type="tx">
   <p:cSld name="Comparison">
     <p:spTree>
       <p:nvGrpSpPr>
@@ -1155,7 +1191,9 @@
       <p:sp>
         <p:nvSpPr>
           <p:cNvPr id="47" name="Titolo Testo"/>
-          <p:cNvSpPr txBox="1"/>
+          <p:cNvSpPr txBox="1">
+            <a:spLocks noGrp="1"/>
+          </p:cNvSpPr>
           <p:nvPr>
             <p:ph type="title"/>
           </p:nvPr>
@@ -1173,7 +1211,6 @@
           <a:bodyPr/>
           <a:lstStyle/>
           <a:p>
-            <a:pPr/>
             <a:r>
               <a:t>Titolo Testo</a:t>
             </a:r>
@@ -1183,7 +1220,9 @@
       <p:sp>
         <p:nvSpPr>
           <p:cNvPr id="48" name="Corpo livello uno…"/>
-          <p:cNvSpPr txBox="1"/>
+          <p:cNvSpPr txBox="1">
+            <a:spLocks noGrp="1"/>
+          </p:cNvSpPr>
           <p:nvPr>
             <p:ph type="body" sz="quarter" idx="1"/>
           </p:nvPr>
@@ -1207,7 +1246,7 @@
               <a:buSzTx/>
               <a:buFontTx/>
               <a:buNone/>
-              <a:defRPr b="1" sz="2400"/>
+              <a:defRPr sz="2400" b="1"/>
             </a:lvl1pPr>
             <a:lvl2pPr marL="0" indent="457200">
               <a:spcBef>
@@ -1216,7 +1255,7 @@
               <a:buSzTx/>
               <a:buFontTx/>
               <a:buNone/>
-              <a:defRPr b="1" sz="2400"/>
+              <a:defRPr sz="2400" b="1"/>
             </a:lvl2pPr>
             <a:lvl3pPr marL="0" indent="914400">
               <a:spcBef>
@@ -1225,7 +1264,7 @@
               <a:buSzTx/>
               <a:buFontTx/>
               <a:buNone/>
-              <a:defRPr b="1" sz="2400"/>
+              <a:defRPr sz="2400" b="1"/>
             </a:lvl3pPr>
             <a:lvl4pPr marL="0" indent="1371600">
               <a:spcBef>
@@ -1234,7 +1273,7 @@
               <a:buSzTx/>
               <a:buFontTx/>
               <a:buNone/>
-              <a:defRPr b="1" sz="2400"/>
+              <a:defRPr sz="2400" b="1"/>
             </a:lvl4pPr>
             <a:lvl5pPr marL="0" indent="1828800">
               <a:spcBef>
@@ -1243,11 +1282,10 @@
               <a:buSzTx/>
               <a:buFontTx/>
               <a:buNone/>
-              <a:defRPr b="1" sz="2400"/>
+              <a:defRPr sz="2400" b="1"/>
             </a:lvl5pPr>
           </a:lstStyle>
           <a:p>
-            <a:pPr/>
             <a:r>
               <a:t>Corpo livello uno</a:t>
             </a:r>
@@ -1281,7 +1319,9 @@
       <p:sp>
         <p:nvSpPr>
           <p:cNvPr id="49" name="Text Placeholder 4"/>
-          <p:cNvSpPr/>
+          <p:cNvSpPr>
+            <a:spLocks noGrp="1"/>
+          </p:cNvSpPr>
           <p:nvPr>
             <p:ph type="body" sz="quarter" idx="21"/>
           </p:nvPr>
@@ -1306,15 +1346,18 @@
               <a:buSzTx/>
               <a:buFontTx/>
               <a:buNone/>
-              <a:defRPr b="1" sz="2400"/>
+              <a:defRPr sz="2400" b="1"/>
             </a:pPr>
+            <a:endParaRPr/>
           </a:p>
         </p:txBody>
       </p:sp>
       <p:sp>
         <p:nvSpPr>
           <p:cNvPr id="50" name="Numero diapositiva"/>
-          <p:cNvSpPr txBox="1"/>
+          <p:cNvSpPr txBox="1">
+            <a:spLocks noGrp="1"/>
+          </p:cNvSpPr>
           <p:nvPr>
             <p:ph type="sldNum" sz="quarter" idx="2"/>
           </p:nvPr>
@@ -1328,8 +1371,10 @@
           <a:bodyPr/>
           <a:lstStyle/>
           <a:p>
-            <a:pPr/>
-            <a:fld id="{86CB4B4D-7CA3-9044-876B-883B54F8677D}" type="slidenum"/>
+            <a:fld id="{86CB4B4D-7CA3-9044-876B-883B54F8677D}" type="slidenum">
+              <a:t>‹#›</a:t>
+            </a:fld>
+            <a:endParaRPr/>
           </a:p>
         </p:txBody>
       </p:sp>
@@ -1338,12 +1383,12 @@
   <p:clrMapOvr>
     <a:masterClrMapping/>
   </p:clrMapOvr>
-  <p:transition xmlns:p14="http://schemas.microsoft.com/office/powerpoint/2010/main" spd="med" advClick="1"/>
+  <p:transition spd="med"/>
 </p:sldLayout>
 </file>
 
 <file path=ppt/slideLayouts/slideLayout6.xml><?xml version="1.0" encoding="utf-8"?>
-<p:sldLayout xmlns:a="http://schemas.openxmlformats.org/drawingml/2006/main" xmlns:r="http://schemas.openxmlformats.org/officeDocument/2006/relationships" xmlns:p="http://schemas.openxmlformats.org/presentationml/2006/main" xmlns:m="http://schemas.openxmlformats.org/officeDocument/2006/math" xmlns:a14="http://schemas.microsoft.com/office/drawing/2010/main" type="tx" showMasterSp="1" showMasterPhAnim="1">
+<p:sldLayout xmlns:a="http://schemas.openxmlformats.org/drawingml/2006/main" xmlns:r="http://schemas.openxmlformats.org/officeDocument/2006/relationships" xmlns:p="http://schemas.openxmlformats.org/presentationml/2006/main" type="tx">
   <p:cSld name="Title Only">
     <p:spTree>
       <p:nvGrpSpPr>
@@ -1362,7 +1407,9 @@
       <p:sp>
         <p:nvSpPr>
           <p:cNvPr id="57" name="Titolo Testo"/>
-          <p:cNvSpPr txBox="1"/>
+          <p:cNvSpPr txBox="1">
+            <a:spLocks noGrp="1"/>
+          </p:cNvSpPr>
           <p:nvPr>
             <p:ph type="title"/>
           </p:nvPr>
@@ -1380,7 +1427,6 @@
           <a:bodyPr/>
           <a:lstStyle/>
           <a:p>
-            <a:pPr/>
             <a:r>
               <a:t>Titolo Testo</a:t>
             </a:r>
@@ -1390,7 +1436,9 @@
       <p:sp>
         <p:nvSpPr>
           <p:cNvPr id="58" name="Numero diapositiva"/>
-          <p:cNvSpPr txBox="1"/>
+          <p:cNvSpPr txBox="1">
+            <a:spLocks noGrp="1"/>
+          </p:cNvSpPr>
           <p:nvPr>
             <p:ph type="sldNum" sz="quarter" idx="2"/>
           </p:nvPr>
@@ -1404,8 +1452,10 @@
           <a:bodyPr/>
           <a:lstStyle/>
           <a:p>
-            <a:pPr/>
-            <a:fld id="{86CB4B4D-7CA3-9044-876B-883B54F8677D}" type="slidenum"/>
+            <a:fld id="{86CB4B4D-7CA3-9044-876B-883B54F8677D}" type="slidenum">
+              <a:t>‹#›</a:t>
+            </a:fld>
+            <a:endParaRPr/>
           </a:p>
         </p:txBody>
       </p:sp>
@@ -1414,12 +1464,12 @@
   <p:clrMapOvr>
     <a:masterClrMapping/>
   </p:clrMapOvr>
-  <p:transition xmlns:p14="http://schemas.microsoft.com/office/powerpoint/2010/main" spd="med" advClick="1"/>
+  <p:transition spd="med"/>
 </p:sldLayout>
 </file>
 
 <file path=ppt/slideLayouts/slideLayout7.xml><?xml version="1.0" encoding="utf-8"?>
-<p:sldLayout xmlns:a="http://schemas.openxmlformats.org/drawingml/2006/main" xmlns:r="http://schemas.openxmlformats.org/officeDocument/2006/relationships" xmlns:p="http://schemas.openxmlformats.org/presentationml/2006/main" xmlns:m="http://schemas.openxmlformats.org/officeDocument/2006/math" xmlns:a14="http://schemas.microsoft.com/office/drawing/2010/main" type="tx" showMasterSp="1" showMasterPhAnim="1">
+<p:sldLayout xmlns:a="http://schemas.openxmlformats.org/drawingml/2006/main" xmlns:r="http://schemas.openxmlformats.org/officeDocument/2006/relationships" xmlns:p="http://schemas.openxmlformats.org/presentationml/2006/main" type="tx">
   <p:cSld name="Blank">
     <p:spTree>
       <p:nvGrpSpPr>
@@ -1438,7 +1488,9 @@
       <p:sp>
         <p:nvSpPr>
           <p:cNvPr id="65" name="Numero diapositiva"/>
-          <p:cNvSpPr txBox="1"/>
+          <p:cNvSpPr txBox="1">
+            <a:spLocks noGrp="1"/>
+          </p:cNvSpPr>
           <p:nvPr>
             <p:ph type="sldNum" sz="quarter" idx="2"/>
           </p:nvPr>
@@ -1452,8 +1504,10 @@
           <a:bodyPr/>
           <a:lstStyle/>
           <a:p>
-            <a:pPr/>
-            <a:fld id="{86CB4B4D-7CA3-9044-876B-883B54F8677D}" type="slidenum"/>
+            <a:fld id="{86CB4B4D-7CA3-9044-876B-883B54F8677D}" type="slidenum">
+              <a:t>‹#›</a:t>
+            </a:fld>
+            <a:endParaRPr/>
           </a:p>
         </p:txBody>
       </p:sp>
@@ -1462,12 +1516,12 @@
   <p:clrMapOvr>
     <a:masterClrMapping/>
   </p:clrMapOvr>
-  <p:transition xmlns:p14="http://schemas.microsoft.com/office/powerpoint/2010/main" spd="med" advClick="1"/>
+  <p:transition spd="med"/>
 </p:sldLayout>
 </file>
 
 <file path=ppt/slideLayouts/slideLayout8.xml><?xml version="1.0" encoding="utf-8"?>
-<p:sldLayout xmlns:a="http://schemas.openxmlformats.org/drawingml/2006/main" xmlns:r="http://schemas.openxmlformats.org/officeDocument/2006/relationships" xmlns:p="http://schemas.openxmlformats.org/presentationml/2006/main" xmlns:m="http://schemas.openxmlformats.org/officeDocument/2006/math" xmlns:a14="http://schemas.microsoft.com/office/drawing/2010/main" type="tx" showMasterSp="1" showMasterPhAnim="1">
+<p:sldLayout xmlns:a="http://schemas.openxmlformats.org/drawingml/2006/main" xmlns:r="http://schemas.openxmlformats.org/officeDocument/2006/relationships" xmlns:p="http://schemas.openxmlformats.org/presentationml/2006/main" type="tx">
   <p:cSld name="Content with Caption">
     <p:spTree>
       <p:nvGrpSpPr>
@@ -1486,7 +1540,9 @@
       <p:sp>
         <p:nvSpPr>
           <p:cNvPr id="72" name="Titolo Testo"/>
-          <p:cNvSpPr txBox="1"/>
+          <p:cNvSpPr txBox="1">
+            <a:spLocks noGrp="1"/>
+          </p:cNvSpPr>
           <p:nvPr>
             <p:ph type="title"/>
           </p:nvPr>
@@ -1504,11 +1560,10 @@
           <a:bodyPr anchor="b"/>
           <a:lstStyle>
             <a:lvl1pPr algn="l">
-              <a:defRPr b="1" sz="2000"/>
+              <a:defRPr sz="2000" b="1"/>
             </a:lvl1pPr>
           </a:lstStyle>
           <a:p>
-            <a:pPr/>
             <a:r>
               <a:t>Titolo Testo</a:t>
             </a:r>
@@ -1518,7 +1573,9 @@
       <p:sp>
         <p:nvSpPr>
           <p:cNvPr id="73" name="Corpo livello uno…"/>
-          <p:cNvSpPr txBox="1"/>
+          <p:cNvSpPr txBox="1">
+            <a:spLocks noGrp="1"/>
+          </p:cNvSpPr>
           <p:nvPr>
             <p:ph type="body" sz="quarter" idx="1"/>
           </p:nvPr>
@@ -1536,7 +1593,6 @@
           <a:bodyPr/>
           <a:lstStyle/>
           <a:p>
-            <a:pPr/>
             <a:r>
               <a:t>Corpo livello uno</a:t>
             </a:r>
@@ -1570,7 +1626,9 @@
       <p:sp>
         <p:nvSpPr>
           <p:cNvPr id="74" name="Text Placeholder 3"/>
-          <p:cNvSpPr/>
+          <p:cNvSpPr>
+            <a:spLocks noGrp="1"/>
+          </p:cNvSpPr>
           <p:nvPr>
             <p:ph type="body" sz="quarter" idx="21"/>
           </p:nvPr>
@@ -1597,13 +1655,16 @@
               <a:buNone/>
               <a:defRPr sz="1400"/>
             </a:pPr>
+            <a:endParaRPr/>
           </a:p>
         </p:txBody>
       </p:sp>
       <p:sp>
         <p:nvSpPr>
           <p:cNvPr id="75" name="Numero diapositiva"/>
-          <p:cNvSpPr txBox="1"/>
+          <p:cNvSpPr txBox="1">
+            <a:spLocks noGrp="1"/>
+          </p:cNvSpPr>
           <p:nvPr>
             <p:ph type="sldNum" sz="quarter" idx="2"/>
           </p:nvPr>
@@ -1617,8 +1678,10 @@
           <a:bodyPr/>
           <a:lstStyle/>
           <a:p>
-            <a:pPr/>
-            <a:fld id="{86CB4B4D-7CA3-9044-876B-883B54F8677D}" type="slidenum"/>
+            <a:fld id="{86CB4B4D-7CA3-9044-876B-883B54F8677D}" type="slidenum">
+              <a:t>‹#›</a:t>
+            </a:fld>
+            <a:endParaRPr/>
           </a:p>
         </p:txBody>
       </p:sp>
@@ -1627,12 +1690,12 @@
   <p:clrMapOvr>
     <a:masterClrMapping/>
   </p:clrMapOvr>
-  <p:transition xmlns:p14="http://schemas.microsoft.com/office/powerpoint/2010/main" spd="med" advClick="1"/>
+  <p:transition spd="med"/>
 </p:sldLayout>
 </file>
 
 <file path=ppt/slideLayouts/slideLayout9.xml><?xml version="1.0" encoding="utf-8"?>
-<p:sldLayout xmlns:a="http://schemas.openxmlformats.org/drawingml/2006/main" xmlns:r="http://schemas.openxmlformats.org/officeDocument/2006/relationships" xmlns:p="http://schemas.openxmlformats.org/presentationml/2006/main" xmlns:m="http://schemas.openxmlformats.org/officeDocument/2006/math" xmlns:a14="http://schemas.microsoft.com/office/drawing/2010/main" type="tx" showMasterSp="1" showMasterPhAnim="1">
+<p:sldLayout xmlns:a="http://schemas.openxmlformats.org/drawingml/2006/main" xmlns:r="http://schemas.openxmlformats.org/officeDocument/2006/relationships" xmlns:p="http://schemas.openxmlformats.org/presentationml/2006/main" type="tx">
   <p:cSld name="Picture with Caption">
     <p:spTree>
       <p:nvGrpSpPr>
@@ -1651,7 +1714,9 @@
       <p:sp>
         <p:nvSpPr>
           <p:cNvPr id="82" name="Titolo Testo"/>
-          <p:cNvSpPr txBox="1"/>
+          <p:cNvSpPr txBox="1">
+            <a:spLocks noGrp="1"/>
+          </p:cNvSpPr>
           <p:nvPr>
             <p:ph type="title"/>
           </p:nvPr>
@@ -1669,11 +1734,10 @@
           <a:bodyPr anchor="b"/>
           <a:lstStyle>
             <a:lvl1pPr algn="l">
-              <a:defRPr b="1" sz="2000"/>
+              <a:defRPr sz="2000" b="1"/>
             </a:lvl1pPr>
           </a:lstStyle>
           <a:p>
-            <a:pPr/>
             <a:r>
               <a:t>Titolo Testo</a:t>
             </a:r>
@@ -1683,7 +1747,9 @@
       <p:sp>
         <p:nvSpPr>
           <p:cNvPr id="83" name="Picture Placeholder 2"/>
-          <p:cNvSpPr/>
+          <p:cNvSpPr>
+            <a:spLocks noGrp="1"/>
+          </p:cNvSpPr>
           <p:nvPr>
             <p:ph type="pic" sz="quarter" idx="21"/>
           </p:nvPr>
@@ -1703,14 +1769,16 @@
           </a:bodyPr>
           <a:lstStyle/>
           <a:p>
-            <a:pPr/>
+            <a:endParaRPr/>
           </a:p>
         </p:txBody>
       </p:sp>
       <p:sp>
         <p:nvSpPr>
           <p:cNvPr id="84" name="Corpo livello uno…"/>
-          <p:cNvSpPr txBox="1"/>
+          <p:cNvSpPr txBox="1">
+            <a:spLocks noGrp="1"/>
+          </p:cNvSpPr>
           <p:nvPr>
             <p:ph type="body" sz="quarter" idx="1"/>
           </p:nvPr>
@@ -1774,7 +1842,6 @@
             </a:lvl5pPr>
           </a:lstStyle>
           <a:p>
-            <a:pPr/>
             <a:r>
               <a:t>Corpo livello uno</a:t>
             </a:r>
@@ -1808,7 +1875,9 @@
       <p:sp>
         <p:nvSpPr>
           <p:cNvPr id="85" name="Numero diapositiva"/>
-          <p:cNvSpPr txBox="1"/>
+          <p:cNvSpPr txBox="1">
+            <a:spLocks noGrp="1"/>
+          </p:cNvSpPr>
           <p:nvPr>
             <p:ph type="sldNum" sz="quarter" idx="2"/>
           </p:nvPr>
@@ -1822,8 +1891,10 @@
           <a:bodyPr/>
           <a:lstStyle/>
           <a:p>
-            <a:pPr/>
-            <a:fld id="{86CB4B4D-7CA3-9044-876B-883B54F8677D}" type="slidenum"/>
+            <a:fld id="{86CB4B4D-7CA3-9044-876B-883B54F8677D}" type="slidenum">
+              <a:t>‹#›</a:t>
+            </a:fld>
+            <a:endParaRPr/>
           </a:p>
         </p:txBody>
       </p:sp>
@@ -1832,18 +1903,19 @@
   <p:clrMapOvr>
     <a:masterClrMapping/>
   </p:clrMapOvr>
-  <p:transition xmlns:p14="http://schemas.microsoft.com/office/powerpoint/2010/main" spd="med" advClick="1"/>
+  <p:transition spd="med"/>
 </p:sldLayout>
 </file>
 
 <file path=ppt/slideMasters/slideMaster1.xml><?xml version="1.0" encoding="utf-8"?>
-<p:sldMaster xmlns:a="http://schemas.openxmlformats.org/drawingml/2006/main" xmlns:r="http://schemas.openxmlformats.org/officeDocument/2006/relationships" xmlns:p="http://schemas.openxmlformats.org/presentationml/2006/main" xmlns:m="http://schemas.openxmlformats.org/officeDocument/2006/math" xmlns:a14="http://schemas.microsoft.com/office/drawing/2010/main">
+<p:sldMaster xmlns:a="http://schemas.openxmlformats.org/drawingml/2006/main" xmlns:r="http://schemas.openxmlformats.org/officeDocument/2006/relationships" xmlns:p="http://schemas.openxmlformats.org/presentationml/2006/main">
   <p:cSld>
     <p:bg>
       <p:bgPr>
         <a:solidFill>
           <a:srgbClr val="FF914D"/>
         </a:solidFill>
+        <a:effectLst/>
       </p:bgPr>
     </p:bg>
     <p:spTree>
@@ -1863,7 +1935,9 @@
       <p:sp>
         <p:nvSpPr>
           <p:cNvPr id="2" name="Titolo Testo"/>
-          <p:cNvSpPr txBox="1"/>
+          <p:cNvSpPr txBox="1">
+            <a:spLocks noGrp="1"/>
+          </p:cNvSpPr>
           <p:nvPr>
             <p:ph type="title"/>
           </p:nvPr>
@@ -1881,17 +1955,16 @@
           </a:ln>
           <a:extLst>
             <a:ext uri="{C572A759-6A51-4108-AA02-DFA0A04FC94B}">
-              <ma14:wrappingTextBoxFlag xmlns:ma14="http://schemas.microsoft.com/office/mac/drawingml/2011/main" val="1"/>
+              <ma14:wrappingTextBoxFlag xmlns:ma14="http://schemas.microsoft.com/office/mac/drawingml/2011/main" xmlns:a14="http://schemas.microsoft.com/office/drawing/2010/main" xmlns:m="http://schemas.openxmlformats.org/officeDocument/2006/math" xmlns="" val="1"/>
             </a:ext>
           </a:extLst>
         </p:spPr>
         <p:txBody>
           <a:bodyPr lIns="45719" rIns="45719" anchor="ctr">
-            <a:normAutofit fontScale="100000" lnSpcReduction="0"/>
+            <a:normAutofit/>
           </a:bodyPr>
           <a:lstStyle/>
           <a:p>
-            <a:pPr/>
             <a:r>
               <a:t>Titolo Testo</a:t>
             </a:r>
@@ -1901,7 +1974,9 @@
       <p:sp>
         <p:nvSpPr>
           <p:cNvPr id="3" name="Corpo livello uno…"/>
-          <p:cNvSpPr txBox="1"/>
+          <p:cNvSpPr txBox="1">
+            <a:spLocks noGrp="1"/>
+          </p:cNvSpPr>
           <p:nvPr>
             <p:ph type="body" idx="1"/>
           </p:nvPr>
@@ -1919,17 +1994,16 @@
           </a:ln>
           <a:extLst>
             <a:ext uri="{C572A759-6A51-4108-AA02-DFA0A04FC94B}">
-              <ma14:wrappingTextBoxFlag xmlns:ma14="http://schemas.microsoft.com/office/mac/drawingml/2011/main" val="1"/>
+              <ma14:wrappingTextBoxFlag xmlns:ma14="http://schemas.microsoft.com/office/mac/drawingml/2011/main" xmlns:a14="http://schemas.microsoft.com/office/drawing/2010/main" xmlns:m="http://schemas.openxmlformats.org/officeDocument/2006/math" xmlns="" val="1"/>
             </a:ext>
           </a:extLst>
         </p:spPr>
         <p:txBody>
           <a:bodyPr lIns="45719" rIns="45719">
-            <a:normAutofit fontScale="100000" lnSpcReduction="0"/>
+            <a:normAutofit/>
           </a:bodyPr>
           <a:lstStyle/>
           <a:p>
-            <a:pPr/>
             <a:r>
               <a:t>Corpo livello uno</a:t>
             </a:r>
@@ -1963,7 +2037,9 @@
       <p:sp>
         <p:nvSpPr>
           <p:cNvPr id="4" name="Numero diapositiva"/>
-          <p:cNvSpPr txBox="1"/>
+          <p:cNvSpPr txBox="1">
+            <a:spLocks noGrp="1"/>
+          </p:cNvSpPr>
           <p:nvPr>
             <p:ph type="sldNum" sz="quarter" idx="2"/>
           </p:nvPr>
@@ -1994,8 +2070,10 @@
             </a:lvl1pPr>
           </a:lstStyle>
           <a:p>
-            <a:pPr/>
-            <a:fld id="{86CB4B4D-7CA3-9044-876B-883B54F8677D}" type="slidenum"/>
+            <a:fld id="{86CB4B4D-7CA3-9044-876B-883B54F8677D}" type="slidenum">
+              <a:t>‹#›</a:t>
+            </a:fld>
+            <a:endParaRPr/>
           </a:p>
         </p:txBody>
       </p:sp>
@@ -2003,17 +2081,17 @@
   </p:cSld>
   <p:clrMap bg1="lt1" tx1="dk1" bg2="lt2" tx2="dk2" accent1="accent1" accent2="accent2" accent3="accent3" accent4="accent4" accent5="accent5" accent6="accent6" hlink="hlink" folHlink="folHlink"/>
   <p:sldLayoutIdLst>
-    <p:sldLayoutId id="2147483649" r:id="rId2"/>
-    <p:sldLayoutId id="2147483650" r:id="rId3"/>
-    <p:sldLayoutId id="2147483651" r:id="rId4"/>
-    <p:sldLayoutId id="2147483652" r:id="rId5"/>
-    <p:sldLayoutId id="2147483653" r:id="rId6"/>
-    <p:sldLayoutId id="2147483654" r:id="rId7"/>
-    <p:sldLayoutId id="2147483655" r:id="rId8"/>
-    <p:sldLayoutId id="2147483656" r:id="rId9"/>
-    <p:sldLayoutId id="2147483657" r:id="rId10"/>
+    <p:sldLayoutId id="2147483649" r:id="rId1"/>
+    <p:sldLayoutId id="2147483650" r:id="rId2"/>
+    <p:sldLayoutId id="2147483651" r:id="rId3"/>
+    <p:sldLayoutId id="2147483652" r:id="rId4"/>
+    <p:sldLayoutId id="2147483653" r:id="rId5"/>
+    <p:sldLayoutId id="2147483654" r:id="rId6"/>
+    <p:sldLayoutId id="2147483655" r:id="rId7"/>
+    <p:sldLayoutId id="2147483656" r:id="rId8"/>
+    <p:sldLayoutId id="2147483657" r:id="rId9"/>
   </p:sldLayoutIdLst>
-  <p:transition xmlns:p14="http://schemas.microsoft.com/office/powerpoint/2010/main" spd="med" advClick="1"/>
+  <p:transition spd="med"/>
   <p:txStyles>
     <p:titleStyle>
       <a:lvl1pPr marL="0" marR="0" indent="0" algn="ctr" defTabSz="914400" rtl="0" latinLnBrk="0">
@@ -2031,7 +2109,7 @@
         <a:buFontTx/>
         <a:buNone/>
         <a:tabLst/>
-        <a:defRPr b="0" baseline="0" cap="none" i="0" spc="0" strike="noStrike" sz="4400" u="none">
+        <a:defRPr sz="4400" b="0" i="0" u="none" strike="noStrike" cap="none" spc="0" baseline="0">
           <a:solidFill>
             <a:srgbClr val="000000"/>
           </a:solidFill>
@@ -2057,7 +2135,7 @@
         <a:buFontTx/>
         <a:buNone/>
         <a:tabLst/>
-        <a:defRPr b="0" baseline="0" cap="none" i="0" spc="0" strike="noStrike" sz="4400" u="none">
+        <a:defRPr sz="4400" b="0" i="0" u="none" strike="noStrike" cap="none" spc="0" baseline="0">
           <a:solidFill>
             <a:srgbClr val="000000"/>
           </a:solidFill>
@@ -2083,7 +2161,7 @@
         <a:buFontTx/>
         <a:buNone/>
         <a:tabLst/>
-        <a:defRPr b="0" baseline="0" cap="none" i="0" spc="0" strike="noStrike" sz="4400" u="none">
+        <a:defRPr sz="4400" b="0" i="0" u="none" strike="noStrike" cap="none" spc="0" baseline="0">
           <a:solidFill>
             <a:srgbClr val="000000"/>
           </a:solidFill>
@@ -2109,7 +2187,7 @@
         <a:buFontTx/>
         <a:buNone/>
         <a:tabLst/>
-        <a:defRPr b="0" baseline="0" cap="none" i="0" spc="0" strike="noStrike" sz="4400" u="none">
+        <a:defRPr sz="4400" b="0" i="0" u="none" strike="noStrike" cap="none" spc="0" baseline="0">
           <a:solidFill>
             <a:srgbClr val="000000"/>
           </a:solidFill>
@@ -2135,7 +2213,7 @@
         <a:buFontTx/>
         <a:buNone/>
         <a:tabLst/>
-        <a:defRPr b="0" baseline="0" cap="none" i="0" spc="0" strike="noStrike" sz="4400" u="none">
+        <a:defRPr sz="4400" b="0" i="0" u="none" strike="noStrike" cap="none" spc="0" baseline="0">
           <a:solidFill>
             <a:srgbClr val="000000"/>
           </a:solidFill>
@@ -2161,7 +2239,7 @@
         <a:buFontTx/>
         <a:buNone/>
         <a:tabLst/>
-        <a:defRPr b="0" baseline="0" cap="none" i="0" spc="0" strike="noStrike" sz="4400" u="none">
+        <a:defRPr sz="4400" b="0" i="0" u="none" strike="noStrike" cap="none" spc="0" baseline="0">
           <a:solidFill>
             <a:srgbClr val="000000"/>
           </a:solidFill>
@@ -2187,7 +2265,7 @@
         <a:buFontTx/>
         <a:buNone/>
         <a:tabLst/>
-        <a:defRPr b="0" baseline="0" cap="none" i="0" spc="0" strike="noStrike" sz="4400" u="none">
+        <a:defRPr sz="4400" b="0" i="0" u="none" strike="noStrike" cap="none" spc="0" baseline="0">
           <a:solidFill>
             <a:srgbClr val="000000"/>
           </a:solidFill>
@@ -2213,7 +2291,7 @@
         <a:buFontTx/>
         <a:buNone/>
         <a:tabLst/>
-        <a:defRPr b="0" baseline="0" cap="none" i="0" spc="0" strike="noStrike" sz="4400" u="none">
+        <a:defRPr sz="4400" b="0" i="0" u="none" strike="noStrike" cap="none" spc="0" baseline="0">
           <a:solidFill>
             <a:srgbClr val="000000"/>
           </a:solidFill>
@@ -2239,7 +2317,7 @@
         <a:buFontTx/>
         <a:buNone/>
         <a:tabLst/>
-        <a:defRPr b="0" baseline="0" cap="none" i="0" spc="0" strike="noStrike" sz="4400" u="none">
+        <a:defRPr sz="4400" b="0" i="0" u="none" strike="noStrike" cap="none" spc="0" baseline="0">
           <a:solidFill>
             <a:srgbClr val="000000"/>
           </a:solidFill>
@@ -2267,7 +2345,7 @@
         <a:buFont typeface="Arial"/>
         <a:buChar char="•"/>
         <a:tabLst/>
-        <a:defRPr b="0" baseline="0" cap="none" i="0" spc="0" strike="noStrike" sz="3200" u="none">
+        <a:defRPr sz="3200" b="0" i="0" u="none" strike="noStrike" cap="none" spc="0" baseline="0">
           <a:solidFill>
             <a:srgbClr val="000000"/>
           </a:solidFill>
@@ -2293,7 +2371,7 @@
         <a:buFont typeface="Arial"/>
         <a:buChar char="–"/>
         <a:tabLst/>
-        <a:defRPr b="0" baseline="0" cap="none" i="0" spc="0" strike="noStrike" sz="3200" u="none">
+        <a:defRPr sz="3200" b="0" i="0" u="none" strike="noStrike" cap="none" spc="0" baseline="0">
           <a:solidFill>
             <a:srgbClr val="000000"/>
           </a:solidFill>
@@ -2319,7 +2397,7 @@
         <a:buFont typeface="Arial"/>
         <a:buChar char="•"/>
         <a:tabLst/>
-        <a:defRPr b="0" baseline="0" cap="none" i="0" spc="0" strike="noStrike" sz="3200" u="none">
+        <a:defRPr sz="3200" b="0" i="0" u="none" strike="noStrike" cap="none" spc="0" baseline="0">
           <a:solidFill>
             <a:srgbClr val="000000"/>
           </a:solidFill>
@@ -2345,7 +2423,7 @@
         <a:buFont typeface="Arial"/>
         <a:buChar char="–"/>
         <a:tabLst/>
-        <a:defRPr b="0" baseline="0" cap="none" i="0" spc="0" strike="noStrike" sz="3200" u="none">
+        <a:defRPr sz="3200" b="0" i="0" u="none" strike="noStrike" cap="none" spc="0" baseline="0">
           <a:solidFill>
             <a:srgbClr val="000000"/>
           </a:solidFill>
@@ -2371,7 +2449,7 @@
         <a:buFont typeface="Arial"/>
         <a:buChar char="»"/>
         <a:tabLst/>
-        <a:defRPr b="0" baseline="0" cap="none" i="0" spc="0" strike="noStrike" sz="3200" u="none">
+        <a:defRPr sz="3200" b="0" i="0" u="none" strike="noStrike" cap="none" spc="0" baseline="0">
           <a:solidFill>
             <a:srgbClr val="000000"/>
           </a:solidFill>
@@ -2397,7 +2475,7 @@
         <a:buFont typeface="Arial"/>
         <a:buChar char="•"/>
         <a:tabLst/>
-        <a:defRPr b="0" baseline="0" cap="none" i="0" spc="0" strike="noStrike" sz="3200" u="none">
+        <a:defRPr sz="3200" b="0" i="0" u="none" strike="noStrike" cap="none" spc="0" baseline="0">
           <a:solidFill>
             <a:srgbClr val="000000"/>
           </a:solidFill>
@@ -2423,7 +2501,7 @@
         <a:buFont typeface="Arial"/>
         <a:buChar char="•"/>
         <a:tabLst/>
-        <a:defRPr b="0" baseline="0" cap="none" i="0" spc="0" strike="noStrike" sz="3200" u="none">
+        <a:defRPr sz="3200" b="0" i="0" u="none" strike="noStrike" cap="none" spc="0" baseline="0">
           <a:solidFill>
             <a:srgbClr val="000000"/>
           </a:solidFill>
@@ -2449,7 +2527,7 @@
         <a:buFont typeface="Arial"/>
         <a:buChar char="•"/>
         <a:tabLst/>
-        <a:defRPr b="0" baseline="0" cap="none" i="0" spc="0" strike="noStrike" sz="3200" u="none">
+        <a:defRPr sz="3200" b="0" i="0" u="none" strike="noStrike" cap="none" spc="0" baseline="0">
           <a:solidFill>
             <a:srgbClr val="000000"/>
           </a:solidFill>
@@ -2475,7 +2553,7 @@
         <a:buFont typeface="Arial"/>
         <a:buChar char="•"/>
         <a:tabLst/>
-        <a:defRPr b="0" baseline="0" cap="none" i="0" spc="0" strike="noStrike" sz="3200" u="none">
+        <a:defRPr sz="3200" b="0" i="0" u="none" strike="noStrike" cap="none" spc="0" baseline="0">
           <a:solidFill>
             <a:srgbClr val="000000"/>
           </a:solidFill>
@@ -2503,7 +2581,7 @@
         <a:buFontTx/>
         <a:buNone/>
         <a:tabLst/>
-        <a:defRPr b="0" baseline="0" cap="none" i="0" spc="0" strike="noStrike" sz="1200" u="none">
+        <a:defRPr sz="1200" b="0" i="0" u="none" strike="noStrike" cap="none" spc="0" baseline="0">
           <a:solidFill>
             <a:schemeClr val="tx1"/>
           </a:solidFill>
@@ -2529,7 +2607,7 @@
         <a:buFontTx/>
         <a:buNone/>
         <a:tabLst/>
-        <a:defRPr b="0" baseline="0" cap="none" i="0" spc="0" strike="noStrike" sz="1200" u="none">
+        <a:defRPr sz="1200" b="0" i="0" u="none" strike="noStrike" cap="none" spc="0" baseline="0">
           <a:solidFill>
             <a:schemeClr val="tx1"/>
           </a:solidFill>
@@ -2555,7 +2633,7 @@
         <a:buFontTx/>
         <a:buNone/>
         <a:tabLst/>
-        <a:defRPr b="0" baseline="0" cap="none" i="0" spc="0" strike="noStrike" sz="1200" u="none">
+        <a:defRPr sz="1200" b="0" i="0" u="none" strike="noStrike" cap="none" spc="0" baseline="0">
           <a:solidFill>
             <a:schemeClr val="tx1"/>
           </a:solidFill>
@@ -2581,7 +2659,7 @@
         <a:buFontTx/>
         <a:buNone/>
         <a:tabLst/>
-        <a:defRPr b="0" baseline="0" cap="none" i="0" spc="0" strike="noStrike" sz="1200" u="none">
+        <a:defRPr sz="1200" b="0" i="0" u="none" strike="noStrike" cap="none" spc="0" baseline="0">
           <a:solidFill>
             <a:schemeClr val="tx1"/>
           </a:solidFill>
@@ -2607,7 +2685,7 @@
         <a:buFontTx/>
         <a:buNone/>
         <a:tabLst/>
-        <a:defRPr b="0" baseline="0" cap="none" i="0" spc="0" strike="noStrike" sz="1200" u="none">
+        <a:defRPr sz="1200" b="0" i="0" u="none" strike="noStrike" cap="none" spc="0" baseline="0">
           <a:solidFill>
             <a:schemeClr val="tx1"/>
           </a:solidFill>
@@ -2633,7 +2711,7 @@
         <a:buFontTx/>
         <a:buNone/>
         <a:tabLst/>
-        <a:defRPr b="0" baseline="0" cap="none" i="0" spc="0" strike="noStrike" sz="1200" u="none">
+        <a:defRPr sz="1200" b="0" i="0" u="none" strike="noStrike" cap="none" spc="0" baseline="0">
           <a:solidFill>
             <a:schemeClr val="tx1"/>
           </a:solidFill>
@@ -2659,7 +2737,7 @@
         <a:buFontTx/>
         <a:buNone/>
         <a:tabLst/>
-        <a:defRPr b="0" baseline="0" cap="none" i="0" spc="0" strike="noStrike" sz="1200" u="none">
+        <a:defRPr sz="1200" b="0" i="0" u="none" strike="noStrike" cap="none" spc="0" baseline="0">
           <a:solidFill>
             <a:schemeClr val="tx1"/>
           </a:solidFill>
@@ -2685,7 +2763,7 @@
         <a:buFontTx/>
         <a:buNone/>
         <a:tabLst/>
-        <a:defRPr b="0" baseline="0" cap="none" i="0" spc="0" strike="noStrike" sz="1200" u="none">
+        <a:defRPr sz="1200" b="0" i="0" u="none" strike="noStrike" cap="none" spc="0" baseline="0">
           <a:solidFill>
             <a:schemeClr val="tx1"/>
           </a:solidFill>
@@ -2711,7 +2789,7 @@
         <a:buFontTx/>
         <a:buNone/>
         <a:tabLst/>
-        <a:defRPr b="0" baseline="0" cap="none" i="0" spc="0" strike="noStrike" sz="1200" u="none">
+        <a:defRPr sz="1200" b="0" i="0" u="none" strike="noStrike" cap="none" spc="0" baseline="0">
           <a:solidFill>
             <a:schemeClr val="tx1"/>
           </a:solidFill>
@@ -2728,7 +2806,7 @@
 </file>
 
 <file path=ppt/slides/slide1.xml><?xml version="1.0" encoding="utf-8"?>
-<p:sld xmlns:a="http://schemas.openxmlformats.org/drawingml/2006/main" xmlns:r="http://schemas.openxmlformats.org/officeDocument/2006/relationships" xmlns:p="http://schemas.openxmlformats.org/presentationml/2006/main" xmlns:m="http://schemas.openxmlformats.org/officeDocument/2006/math" xmlns:a14="http://schemas.microsoft.com/office/drawing/2010/main" showMasterSp="1" showMasterPhAnim="1">
+<p:sld xmlns:a="http://schemas.openxmlformats.org/drawingml/2006/main" xmlns:r="http://schemas.openxmlformats.org/officeDocument/2006/relationships" xmlns:p="http://schemas.openxmlformats.org/presentationml/2006/main">
   <p:cSld>
     <p:spTree>
       <p:nvGrpSpPr>
@@ -2769,7 +2847,7 @@
           <a:bodyPr lIns="45719" rIns="45719"/>
           <a:lstStyle/>
           <a:p>
-            <a:pPr/>
+            <a:endParaRPr/>
           </a:p>
         </p:txBody>
       </p:sp>
@@ -2782,9 +2860,7 @@
           <p:nvPr/>
         </p:nvPicPr>
         <p:blipFill>
-          <a:blip r:embed="rId2">
-            <a:extLst/>
-          </a:blip>
+          <a:blip r:embed="rId2"/>
           <a:stretch>
             <a:fillRect/>
           </a:stretch>
@@ -2821,7 +2897,7 @@
           </a:ln>
           <a:extLst>
             <a:ext uri="{C572A759-6A51-4108-AA02-DFA0A04FC94B}">
-              <ma14:wrappingTextBoxFlag xmlns:ma14="http://schemas.microsoft.com/office/mac/drawingml/2011/main" val="1"/>
+              <ma14:wrappingTextBoxFlag xmlns:ma14="http://schemas.microsoft.com/office/mac/drawingml/2011/main" xmlns:a14="http://schemas.microsoft.com/office/drawing/2010/main" xmlns:m="http://schemas.openxmlformats.org/officeDocument/2006/math" xmlns="" val="1"/>
             </a:ext>
           </a:extLst>
         </p:spPr>
@@ -2843,7 +2919,6 @@
             </a:lvl1pPr>
           </a:lstStyle>
           <a:p>
-            <a:pPr/>
             <a:r>
               <a:t>Esercitazione 8</a:t>
             </a:r>
@@ -2869,7 +2944,7 @@
           </a:ln>
           <a:extLst>
             <a:ext uri="{C572A759-6A51-4108-AA02-DFA0A04FC94B}">
-              <ma14:wrappingTextBoxFlag xmlns:ma14="http://schemas.microsoft.com/office/mac/drawingml/2011/main" val="1"/>
+              <ma14:wrappingTextBoxFlag xmlns:ma14="http://schemas.microsoft.com/office/mac/drawingml/2011/main" xmlns:a14="http://schemas.microsoft.com/office/drawing/2010/main" xmlns:m="http://schemas.openxmlformats.org/officeDocument/2006/math" xmlns="" val="1"/>
             </a:ext>
           </a:extLst>
         </p:spPr>
@@ -2886,7 +2961,6 @@
             </a:lvl1pPr>
           </a:lstStyle>
           <a:p>
-            <a:pPr/>
             <a:r>
               <a:t>Introduzione alle RPC di SUN</a:t>
             </a:r>
@@ -2912,7 +2986,7 @@
           </a:ln>
           <a:extLst>
             <a:ext uri="{C572A759-6A51-4108-AA02-DFA0A04FC94B}">
-              <ma14:wrappingTextBoxFlag xmlns:ma14="http://schemas.microsoft.com/office/mac/drawingml/2011/main" val="1"/>
+              <ma14:wrappingTextBoxFlag xmlns:ma14="http://schemas.microsoft.com/office/mac/drawingml/2011/main" xmlns:a14="http://schemas.microsoft.com/office/drawing/2010/main" xmlns:m="http://schemas.openxmlformats.org/officeDocument/2006/math" xmlns="" val="1"/>
             </a:ext>
           </a:extLst>
         </p:spPr>
@@ -3018,7 +3092,7 @@
           </a:ln>
           <a:extLst>
             <a:ext uri="{C572A759-6A51-4108-AA02-DFA0A04FC94B}">
-              <ma14:wrappingTextBoxFlag xmlns:ma14="http://schemas.microsoft.com/office/mac/drawingml/2011/main" val="1"/>
+              <ma14:wrappingTextBoxFlag xmlns:ma14="http://schemas.microsoft.com/office/mac/drawingml/2011/main" xmlns:a14="http://schemas.microsoft.com/office/drawing/2010/main" xmlns:m="http://schemas.openxmlformats.org/officeDocument/2006/math" xmlns="" val="1"/>
             </a:ext>
           </a:extLst>
         </p:spPr>
@@ -3040,7 +3114,6 @@
             </a:lvl1pPr>
           </a:lstStyle>
           <a:p>
-            <a:pPr/>
             <a:r>
               <a:t>7 Dicembre 2021</a:t>
             </a:r>
@@ -3092,7 +3165,7 @@
               </a:cxnLst>
               <a:rect l="0" t="0" r="r" b="b"/>
               <a:pathLst>
-                <a:path w="21600" h="21600" fill="norm" stroke="1" extrusionOk="0">
+                <a:path w="21600" h="21600" extrusionOk="0">
                   <a:moveTo>
                     <a:pt x="10800" y="0"/>
                   </a:moveTo>
@@ -3135,7 +3208,7 @@
             </a:bodyPr>
             <a:lstStyle/>
             <a:p>
-              <a:pPr/>
+              <a:endParaRPr/>
             </a:p>
           </p:txBody>
         </p:sp>
@@ -3161,7 +3234,7 @@
             <a:effectLst/>
             <a:extLst>
               <a:ext uri="{C572A759-6A51-4108-AA02-DFA0A04FC94B}">
-                <ma14:wrappingTextBoxFlag xmlns:ma14="http://schemas.microsoft.com/office/mac/drawingml/2011/main" val="1"/>
+                <ma14:wrappingTextBoxFlag xmlns:ma14="http://schemas.microsoft.com/office/mac/drawingml/2011/main" xmlns:a14="http://schemas.microsoft.com/office/drawing/2010/main" xmlns:m="http://schemas.openxmlformats.org/officeDocument/2006/math" xmlns="" val="1"/>
               </a:ext>
             </a:extLst>
           </p:spPr>
@@ -3186,7 +3259,6 @@
               </a:lvl1pPr>
             </a:lstStyle>
             <a:p>
-              <a:pPr/>
               <a:r>
                 <a:t>1</a:t>
               </a:r>
@@ -3199,12 +3271,12 @@
   <p:clrMapOvr>
     <a:masterClrMapping/>
   </p:clrMapOvr>
-  <p:transition xmlns:p14="http://schemas.microsoft.com/office/powerpoint/2010/main" spd="med" advClick="1"/>
+  <p:transition spd="med"/>
 </p:sld>
 </file>
 
 <file path=ppt/slides/slide2.xml><?xml version="1.0" encoding="utf-8"?>
-<p:sld xmlns:a="http://schemas.openxmlformats.org/drawingml/2006/main" xmlns:r="http://schemas.openxmlformats.org/officeDocument/2006/relationships" xmlns:p="http://schemas.openxmlformats.org/presentationml/2006/main" xmlns:m="http://schemas.openxmlformats.org/officeDocument/2006/math" xmlns:a14="http://schemas.microsoft.com/office/drawing/2010/main" showMasterSp="1" showMasterPhAnim="1">
+<p:sld xmlns:a="http://schemas.openxmlformats.org/drawingml/2006/main" xmlns:r="http://schemas.openxmlformats.org/officeDocument/2006/relationships" xmlns:p="http://schemas.openxmlformats.org/presentationml/2006/main">
   <p:cSld>
     <p:spTree>
       <p:nvGrpSpPr>
@@ -3245,7 +3317,7 @@
           <a:bodyPr lIns="45719" rIns="45719"/>
           <a:lstStyle/>
           <a:p>
-            <a:pPr/>
+            <a:endParaRPr/>
           </a:p>
         </p:txBody>
       </p:sp>
@@ -3294,7 +3366,7 @@
               </a:cxnLst>
               <a:rect l="0" t="0" r="r" b="b"/>
               <a:pathLst>
-                <a:path w="21600" h="21600" fill="norm" stroke="1" extrusionOk="0">
+                <a:path w="21600" h="21600" extrusionOk="0">
                   <a:moveTo>
                     <a:pt x="10800" y="0"/>
                   </a:moveTo>
@@ -3337,7 +3409,7 @@
             </a:bodyPr>
             <a:lstStyle/>
             <a:p>
-              <a:pPr/>
+              <a:endParaRPr/>
             </a:p>
           </p:txBody>
         </p:sp>
@@ -3363,7 +3435,7 @@
             <a:effectLst/>
             <a:extLst>
               <a:ext uri="{C572A759-6A51-4108-AA02-DFA0A04FC94B}">
-                <ma14:wrappingTextBoxFlag xmlns:ma14="http://schemas.microsoft.com/office/mac/drawingml/2011/main" val="1"/>
+                <ma14:wrappingTextBoxFlag xmlns:ma14="http://schemas.microsoft.com/office/mac/drawingml/2011/main" xmlns:a14="http://schemas.microsoft.com/office/drawing/2010/main" xmlns:m="http://schemas.openxmlformats.org/officeDocument/2006/math" xmlns="" val="1"/>
               </a:ext>
             </a:extLst>
           </p:spPr>
@@ -3388,7 +3460,6 @@
               </a:lvl1pPr>
             </a:lstStyle>
             <a:p>
-              <a:pPr/>
               <a:r>
                 <a:t>2</a:t>
               </a:r>
@@ -3415,7 +3486,7 @@
           </a:ln>
           <a:extLst>
             <a:ext uri="{C572A759-6A51-4108-AA02-DFA0A04FC94B}">
-              <ma14:wrappingTextBoxFlag xmlns:ma14="http://schemas.microsoft.com/office/mac/drawingml/2011/main" val="1"/>
+              <ma14:wrappingTextBoxFlag xmlns:ma14="http://schemas.microsoft.com/office/mac/drawingml/2011/main" xmlns:a14="http://schemas.microsoft.com/office/drawing/2010/main" xmlns:m="http://schemas.openxmlformats.org/officeDocument/2006/math" xmlns="" val="1"/>
             </a:ext>
           </a:extLst>
         </p:spPr>
@@ -3437,7 +3508,6 @@
             </a:lvl1pPr>
           </a:lstStyle>
           <a:p>
-            <a:pPr/>
             <a:r>
               <a:t>Obiettivi esercitazione</a:t>
             </a:r>
@@ -3463,7 +3533,7 @@
           </a:ln>
           <a:extLst>
             <a:ext uri="{C572A759-6A51-4108-AA02-DFA0A04FC94B}">
-              <ma14:wrappingTextBoxFlag xmlns:ma14="http://schemas.microsoft.com/office/mac/drawingml/2011/main" val="1"/>
+              <ma14:wrappingTextBoxFlag xmlns:ma14="http://schemas.microsoft.com/office/mac/drawingml/2011/main" xmlns:a14="http://schemas.microsoft.com/office/drawing/2010/main" xmlns:m="http://schemas.openxmlformats.org/officeDocument/2006/math" xmlns="" val="1"/>
             </a:ext>
           </a:extLst>
         </p:spPr>
@@ -3485,7 +3555,6 @@
             </a:lvl1pPr>
           </a:lstStyle>
           <a:p>
-            <a:pPr/>
             <a:r>
               <a:t>Hard skills</a:t>
             </a:r>
@@ -3511,7 +3580,7 @@
           </a:ln>
           <a:extLst>
             <a:ext uri="{C572A759-6A51-4108-AA02-DFA0A04FC94B}">
-              <ma14:wrappingTextBoxFlag xmlns:ma14="http://schemas.microsoft.com/office/mac/drawingml/2011/main" val="1"/>
+              <ma14:wrappingTextBoxFlag xmlns:ma14="http://schemas.microsoft.com/office/mac/drawingml/2011/main" xmlns:a14="http://schemas.microsoft.com/office/drawing/2010/main" xmlns:m="http://schemas.openxmlformats.org/officeDocument/2006/math" xmlns="" val="1"/>
             </a:ext>
           </a:extLst>
         </p:spPr>
@@ -3536,7 +3605,6 @@
             </a:lvl1pPr>
           </a:lstStyle>
           <a:p>
-            <a:pPr/>
             <a:r>
               <a:t>Soft skills</a:t>
             </a:r>
@@ -3562,7 +3630,7 @@
           </a:ln>
           <a:extLst>
             <a:ext uri="{C572A759-6A51-4108-AA02-DFA0A04FC94B}">
-              <ma14:wrappingTextBoxFlag xmlns:ma14="http://schemas.microsoft.com/office/mac/drawingml/2011/main" val="1"/>
+              <ma14:wrappingTextBoxFlag xmlns:ma14="http://schemas.microsoft.com/office/mac/drawingml/2011/main" xmlns:a14="http://schemas.microsoft.com/office/drawing/2010/main" xmlns:m="http://schemas.openxmlformats.org/officeDocument/2006/math" xmlns="" val="1"/>
             </a:ext>
           </a:extLst>
         </p:spPr>
@@ -3587,7 +3655,6 @@
             </a:lvl1pPr>
           </a:lstStyle>
           <a:p>
-            <a:pPr/>
             <a:r>
               <a:t>Organizzazione del proprio lavoro in team</a:t>
             </a:r>
@@ -3639,7 +3706,7 @@
               </a:cxnLst>
               <a:rect l="0" t="0" r="r" b="b"/>
               <a:pathLst>
-                <a:path w="21600" h="21600" fill="norm" stroke="1" extrusionOk="0">
+                <a:path w="21600" h="21600" extrusionOk="0">
                   <a:moveTo>
                     <a:pt x="10800" y="0"/>
                   </a:moveTo>
@@ -3682,7 +3749,7 @@
             </a:bodyPr>
             <a:lstStyle/>
             <a:p>
-              <a:pPr/>
+              <a:endParaRPr/>
             </a:p>
           </p:txBody>
         </p:sp>
@@ -3708,7 +3775,7 @@
             <a:effectLst/>
             <a:extLst>
               <a:ext uri="{C572A759-6A51-4108-AA02-DFA0A04FC94B}">
-                <ma14:wrappingTextBoxFlag xmlns:ma14="http://schemas.microsoft.com/office/mac/drawingml/2011/main" val="1"/>
+                <ma14:wrappingTextBoxFlag xmlns:ma14="http://schemas.microsoft.com/office/mac/drawingml/2011/main" xmlns:a14="http://schemas.microsoft.com/office/drawing/2010/main" xmlns:m="http://schemas.openxmlformats.org/officeDocument/2006/math" xmlns="" val="1"/>
               </a:ext>
             </a:extLst>
           </p:spPr>
@@ -3733,7 +3800,6 @@
               </a:lvl1pPr>
             </a:lstStyle>
             <a:p>
-              <a:pPr/>
               <a:r>
                 <a:t>1</a:t>
               </a:r>
@@ -3760,7 +3826,7 @@
           </a:ln>
           <a:extLst>
             <a:ext uri="{C572A759-6A51-4108-AA02-DFA0A04FC94B}">
-              <ma14:wrappingTextBoxFlag xmlns:ma14="http://schemas.microsoft.com/office/mac/drawingml/2011/main" val="1"/>
+              <ma14:wrappingTextBoxFlag xmlns:ma14="http://schemas.microsoft.com/office/mac/drawingml/2011/main" xmlns:a14="http://schemas.microsoft.com/office/drawing/2010/main" xmlns:m="http://schemas.openxmlformats.org/officeDocument/2006/math" xmlns="" val="1"/>
             </a:ext>
           </a:extLst>
         </p:spPr>
@@ -3782,7 +3848,6 @@
             </a:lvl1pPr>
           </a:lstStyle>
           <a:p>
-            <a:pPr/>
             <a:r>
               <a:t>Invocazione di procedure remote mediante RPC di SUN</a:t>
             </a:r>
@@ -3834,7 +3899,7 @@
               </a:cxnLst>
               <a:rect l="0" t="0" r="r" b="b"/>
               <a:pathLst>
-                <a:path w="21600" h="21600" fill="norm" stroke="1" extrusionOk="0">
+                <a:path w="21600" h="21600" extrusionOk="0">
                   <a:moveTo>
                     <a:pt x="10800" y="0"/>
                   </a:moveTo>
@@ -3877,7 +3942,7 @@
             </a:bodyPr>
             <a:lstStyle/>
             <a:p>
-              <a:pPr/>
+              <a:endParaRPr/>
             </a:p>
           </p:txBody>
         </p:sp>
@@ -3903,7 +3968,7 @@
             <a:effectLst/>
             <a:extLst>
               <a:ext uri="{C572A759-6A51-4108-AA02-DFA0A04FC94B}">
-                <ma14:wrappingTextBoxFlag xmlns:ma14="http://schemas.microsoft.com/office/mac/drawingml/2011/main" val="1"/>
+                <ma14:wrappingTextBoxFlag xmlns:ma14="http://schemas.microsoft.com/office/mac/drawingml/2011/main" xmlns:a14="http://schemas.microsoft.com/office/drawing/2010/main" xmlns:m="http://schemas.openxmlformats.org/officeDocument/2006/math" xmlns="" val="1"/>
               </a:ext>
             </a:extLst>
           </p:spPr>
@@ -3928,7 +3993,6 @@
               </a:lvl1pPr>
             </a:lstStyle>
             <a:p>
-              <a:pPr/>
               <a:r>
                 <a:t>2</a:t>
               </a:r>
@@ -3955,7 +4019,7 @@
           </a:ln>
           <a:extLst>
             <a:ext uri="{C572A759-6A51-4108-AA02-DFA0A04FC94B}">
-              <ma14:wrappingTextBoxFlag xmlns:ma14="http://schemas.microsoft.com/office/mac/drawingml/2011/main" val="1"/>
+              <ma14:wrappingTextBoxFlag xmlns:ma14="http://schemas.microsoft.com/office/mac/drawingml/2011/main" xmlns:a14="http://schemas.microsoft.com/office/drawing/2010/main" xmlns:m="http://schemas.openxmlformats.org/officeDocument/2006/math" xmlns="" val="1"/>
             </a:ext>
           </a:extLst>
         </p:spPr>
@@ -3977,7 +4041,6 @@
             </a:lvl1pPr>
           </a:lstStyle>
           <a:p>
-            <a:pPr/>
             <a:r>
               <a:t>Operazioni su file di testo remoti</a:t>
             </a:r>
@@ -4029,7 +4092,7 @@
               </a:cxnLst>
               <a:rect l="0" t="0" r="r" b="b"/>
               <a:pathLst>
-                <a:path w="21600" h="21600" fill="norm" stroke="1" extrusionOk="0">
+                <a:path w="21600" h="21600" extrusionOk="0">
                   <a:moveTo>
                     <a:pt x="10800" y="0"/>
                   </a:moveTo>
@@ -4072,7 +4135,7 @@
             </a:bodyPr>
             <a:lstStyle/>
             <a:p>
-              <a:pPr/>
+              <a:endParaRPr/>
             </a:p>
           </p:txBody>
         </p:sp>
@@ -4098,7 +4161,7 @@
             <a:effectLst/>
             <a:extLst>
               <a:ext uri="{C572A759-6A51-4108-AA02-DFA0A04FC94B}">
-                <ma14:wrappingTextBoxFlag xmlns:ma14="http://schemas.microsoft.com/office/mac/drawingml/2011/main" val="1"/>
+                <ma14:wrappingTextBoxFlag xmlns:ma14="http://schemas.microsoft.com/office/mac/drawingml/2011/main" xmlns:a14="http://schemas.microsoft.com/office/drawing/2010/main" xmlns:m="http://schemas.openxmlformats.org/officeDocument/2006/math" xmlns="" val="1"/>
               </a:ext>
             </a:extLst>
           </p:spPr>
@@ -4123,7 +4186,6 @@
               </a:lvl1pPr>
             </a:lstStyle>
             <a:p>
-              <a:pPr/>
               <a:r>
                 <a:t>1</a:t>
               </a:r>
@@ -4176,7 +4238,7 @@
               </a:cxnLst>
               <a:rect l="0" t="0" r="r" b="b"/>
               <a:pathLst>
-                <a:path w="21600" h="21600" fill="norm" stroke="1" extrusionOk="0">
+                <a:path w="21600" h="21600" extrusionOk="0">
                   <a:moveTo>
                     <a:pt x="10800" y="0"/>
                   </a:moveTo>
@@ -4219,7 +4281,7 @@
             </a:bodyPr>
             <a:lstStyle/>
             <a:p>
-              <a:pPr/>
+              <a:endParaRPr/>
             </a:p>
           </p:txBody>
         </p:sp>
@@ -4245,7 +4307,7 @@
             <a:effectLst/>
             <a:extLst>
               <a:ext uri="{C572A759-6A51-4108-AA02-DFA0A04FC94B}">
-                <ma14:wrappingTextBoxFlag xmlns:ma14="http://schemas.microsoft.com/office/mac/drawingml/2011/main" val="1"/>
+                <ma14:wrappingTextBoxFlag xmlns:ma14="http://schemas.microsoft.com/office/mac/drawingml/2011/main" xmlns:a14="http://schemas.microsoft.com/office/drawing/2010/main" xmlns:m="http://schemas.openxmlformats.org/officeDocument/2006/math" xmlns="" val="1"/>
               </a:ext>
             </a:extLst>
           </p:spPr>
@@ -4270,7 +4332,6 @@
               </a:lvl1pPr>
             </a:lstStyle>
             <a:p>
-              <a:pPr/>
               <a:r>
                 <a:t>2</a:t>
               </a:r>
@@ -4297,7 +4358,7 @@
           </a:ln>
           <a:extLst>
             <a:ext uri="{C572A759-6A51-4108-AA02-DFA0A04FC94B}">
-              <ma14:wrappingTextBoxFlag xmlns:ma14="http://schemas.microsoft.com/office/mac/drawingml/2011/main" val="1"/>
+              <ma14:wrappingTextBoxFlag xmlns:ma14="http://schemas.microsoft.com/office/mac/drawingml/2011/main" xmlns:a14="http://schemas.microsoft.com/office/drawing/2010/main" xmlns:m="http://schemas.openxmlformats.org/officeDocument/2006/math" xmlns="" val="1"/>
             </a:ext>
           </a:extLst>
         </p:spPr>
@@ -4322,7 +4383,6 @@
             </a:lvl1pPr>
           </a:lstStyle>
           <a:p>
-            <a:pPr/>
             <a:r>
               <a:t>Collaborazione per raggiungere un fine comune</a:t>
             </a:r>
@@ -4334,12 +4394,12 @@
   <p:clrMapOvr>
     <a:masterClrMapping/>
   </p:clrMapOvr>
-  <p:transition xmlns:p14="http://schemas.microsoft.com/office/powerpoint/2010/main" spd="med" advClick="1"/>
+  <p:transition spd="med"/>
 </p:sld>
 </file>
 
 <file path=ppt/slides/slide3.xml><?xml version="1.0" encoding="utf-8"?>
-<p:sld xmlns:a="http://schemas.openxmlformats.org/drawingml/2006/main" xmlns:r="http://schemas.openxmlformats.org/officeDocument/2006/relationships" xmlns:p="http://schemas.openxmlformats.org/presentationml/2006/main" xmlns:m="http://schemas.openxmlformats.org/officeDocument/2006/math" xmlns:a14="http://schemas.microsoft.com/office/drawing/2010/main" showMasterSp="1" showMasterPhAnim="1">
+<p:sld xmlns:a="http://schemas.openxmlformats.org/drawingml/2006/main" xmlns:r="http://schemas.openxmlformats.org/officeDocument/2006/relationships" xmlns:p="http://schemas.openxmlformats.org/presentationml/2006/main">
   <p:cSld>
     <p:spTree>
       <p:nvGrpSpPr>
@@ -4400,7 +4460,7 @@
               </a:cxnLst>
               <a:rect l="0" t="0" r="r" b="b"/>
               <a:pathLst>
-                <a:path w="21600" h="21600" fill="norm" stroke="1" extrusionOk="0">
+                <a:path w="21600" h="21600" extrusionOk="0">
                   <a:moveTo>
                     <a:pt x="10800" y="0"/>
                   </a:moveTo>
@@ -4443,7 +4503,7 @@
             </a:bodyPr>
             <a:lstStyle/>
             <a:p>
-              <a:pPr/>
+              <a:endParaRPr/>
             </a:p>
           </p:txBody>
         </p:sp>
@@ -4471,7 +4531,7 @@
             <a:effectLst/>
             <a:extLst>
               <a:ext uri="{C572A759-6A51-4108-AA02-DFA0A04FC94B}">
-                <ma14:wrappingTextBoxFlag xmlns:ma14="http://schemas.microsoft.com/office/mac/drawingml/2011/main" val="1"/>
+                <ma14:wrappingTextBoxFlag xmlns:ma14="http://schemas.microsoft.com/office/mac/drawingml/2011/main" xmlns:a14="http://schemas.microsoft.com/office/drawing/2010/main" xmlns:m="http://schemas.openxmlformats.org/officeDocument/2006/math" xmlns="" val="1"/>
               </a:ext>
             </a:extLst>
           </p:spPr>
@@ -4496,7 +4556,6 @@
               </a:lvl1pPr>
             </a:lstStyle>
             <a:p>
-              <a:pPr/>
               <a:r>
                 <a:t>3</a:t>
               </a:r>
@@ -4523,12 +4582,12 @@
           </a:ln>
           <a:extLst>
             <a:ext uri="{C572A759-6A51-4108-AA02-DFA0A04FC94B}">
-              <ma14:wrappingTextBoxFlag xmlns:ma14="http://schemas.microsoft.com/office/mac/drawingml/2011/main" val="1"/>
+              <ma14:wrappingTextBoxFlag xmlns:ma14="http://schemas.microsoft.com/office/mac/drawingml/2011/main" xmlns:a14="http://schemas.microsoft.com/office/drawing/2010/main" xmlns:m="http://schemas.openxmlformats.org/officeDocument/2006/math" xmlns="" val="1"/>
             </a:ext>
           </a:extLst>
         </p:spPr>
         <p:txBody>
-          <a:bodyPr lIns="0" tIns="0" rIns="0" bIns="0">
+          <a:bodyPr lIns="0" tIns="0" rIns="0" bIns="0" anchor="t">
             <a:spAutoFit/>
           </a:bodyPr>
           <a:lstStyle>
@@ -4545,24 +4604,59 @@
             </a:lvl1pPr>
           </a:lstStyle>
           <a:p>
-            <a:pPr/>
             <a:r>
-              <a:t>count.x</a:t>
+              <a:rPr lang="en-US" dirty="0" err="1"/>
+              <a:t>scan</a:t>
             </a:r>
+            <a:r>
+              <a:rPr dirty="0" err="1"/>
+              <a:t>.x</a:t>
+            </a:r>
+            <a:endParaRPr lang="en-US" dirty="0" err="1"/>
           </a:p>
         </p:txBody>
       </p:sp>
+      <p:pic>
+        <p:nvPicPr>
+          <p:cNvPr id="2" name="Picture 2" descr="Text&#10;&#10;Description automatically generated">
+            <a:extLst>
+              <a:ext uri="{FF2B5EF4-FFF2-40B4-BE49-F238E27FC236}">
+                <a16:creationId xmlns:a16="http://schemas.microsoft.com/office/drawing/2014/main" id="{54D2FFB2-5265-4EFF-AA96-44B8B240C30E}"/>
+              </a:ext>
+            </a:extLst>
+          </p:cNvPr>
+          <p:cNvPicPr>
+            <a:picLocks noChangeAspect="1"/>
+          </p:cNvPicPr>
+          <p:nvPr/>
+        </p:nvPicPr>
+        <p:blipFill>
+          <a:blip r:embed="rId2"/>
+          <a:stretch>
+            <a:fillRect/>
+          </a:stretch>
+        </p:blipFill>
+        <p:spPr>
+          <a:xfrm>
+            <a:off x="293914" y="1457894"/>
+            <a:ext cx="6923314" cy="8002584"/>
+          </a:xfrm>
+          <a:prstGeom prst="rect">
+            <a:avLst/>
+          </a:prstGeom>
+        </p:spPr>
+      </p:pic>
     </p:spTree>
   </p:cSld>
   <p:clrMapOvr>
     <a:masterClrMapping/>
   </p:clrMapOvr>
-  <p:transition xmlns:p14="http://schemas.microsoft.com/office/powerpoint/2010/main" spd="med" advClick="1"/>
+  <p:transition spd="med"/>
 </p:sld>
 </file>
 
 <file path=ppt/slides/slide4.xml><?xml version="1.0" encoding="utf-8"?>
-<p:sld xmlns:a="http://schemas.openxmlformats.org/drawingml/2006/main" xmlns:r="http://schemas.openxmlformats.org/officeDocument/2006/relationships" xmlns:p="http://schemas.openxmlformats.org/presentationml/2006/main" xmlns:m="http://schemas.openxmlformats.org/officeDocument/2006/math" xmlns:a14="http://schemas.microsoft.com/office/drawing/2010/main" showMasterSp="1" showMasterPhAnim="1">
+<p:sld xmlns:a="http://schemas.openxmlformats.org/drawingml/2006/main" xmlns:r="http://schemas.openxmlformats.org/officeDocument/2006/relationships" xmlns:p="http://schemas.openxmlformats.org/presentationml/2006/main">
   <p:cSld>
     <p:spTree>
       <p:nvGrpSpPr>
@@ -4603,7 +4697,7 @@
           <a:bodyPr lIns="45719" rIns="45719"/>
           <a:lstStyle/>
           <a:p>
-            <a:pPr/>
+            <a:endParaRPr/>
           </a:p>
         </p:txBody>
       </p:sp>
@@ -4626,12 +4720,12 @@
           </a:ln>
           <a:extLst>
             <a:ext uri="{C572A759-6A51-4108-AA02-DFA0A04FC94B}">
-              <ma14:wrappingTextBoxFlag xmlns:ma14="http://schemas.microsoft.com/office/mac/drawingml/2011/main" val="1"/>
+              <ma14:wrappingTextBoxFlag xmlns:ma14="http://schemas.microsoft.com/office/mac/drawingml/2011/main" xmlns:a14="http://schemas.microsoft.com/office/drawing/2010/main" xmlns:m="http://schemas.openxmlformats.org/officeDocument/2006/math" xmlns="" val="1"/>
             </a:ext>
           </a:extLst>
         </p:spPr>
         <p:txBody>
-          <a:bodyPr lIns="0" tIns="0" rIns="0" bIns="0">
+          <a:bodyPr lIns="0" tIns="0" rIns="0" bIns="0" anchor="t">
             <a:spAutoFit/>
           </a:bodyPr>
           <a:lstStyle>
@@ -4651,9 +4745,9 @@
             </a:lvl1pPr>
           </a:lstStyle>
           <a:p>
-            <a:pPr/>
             <a:r>
-              <a:t>Client</a:t>
+              <a:rPr lang="en-US" dirty="0" err="1"/>
+              <a:t>file_scan</a:t>
             </a:r>
           </a:p>
         </p:txBody>
@@ -4703,7 +4797,7 @@
               </a:cxnLst>
               <a:rect l="0" t="0" r="r" b="b"/>
               <a:pathLst>
-                <a:path w="21600" h="21600" fill="norm" stroke="1" extrusionOk="0">
+                <a:path w="21600" h="21600" extrusionOk="0">
                   <a:moveTo>
                     <a:pt x="10800" y="0"/>
                   </a:moveTo>
@@ -4746,7 +4840,7 @@
             </a:bodyPr>
             <a:lstStyle/>
             <a:p>
-              <a:pPr/>
+              <a:endParaRPr/>
             </a:p>
           </p:txBody>
         </p:sp>
@@ -4772,7 +4866,7 @@
             <a:effectLst/>
             <a:extLst>
               <a:ext uri="{C572A759-6A51-4108-AA02-DFA0A04FC94B}">
-                <ma14:wrappingTextBoxFlag xmlns:ma14="http://schemas.microsoft.com/office/mac/drawingml/2011/main" val="1"/>
+                <ma14:wrappingTextBoxFlag xmlns:ma14="http://schemas.microsoft.com/office/mac/drawingml/2011/main" xmlns:a14="http://schemas.microsoft.com/office/drawing/2010/main" xmlns:m="http://schemas.openxmlformats.org/officeDocument/2006/math" xmlns="" val="1"/>
               </a:ext>
             </a:extLst>
           </p:spPr>
@@ -4797,7 +4891,6 @@
               </a:lvl1pPr>
             </a:lstStyle>
             <a:p>
-              <a:pPr/>
               <a:r>
                 <a:t>4</a:t>
               </a:r>
@@ -4805,17 +4898,47 @@
           </p:txBody>
         </p:sp>
       </p:grpSp>
+      <p:pic>
+        <p:nvPicPr>
+          <p:cNvPr id="2" name="Picture 2" descr="Text&#10;&#10;Description automatically generated">
+            <a:extLst>
+              <a:ext uri="{FF2B5EF4-FFF2-40B4-BE49-F238E27FC236}">
+                <a16:creationId xmlns:a16="http://schemas.microsoft.com/office/drawing/2014/main" id="{44A11641-B7EC-41FA-892A-480BB7B159E2}"/>
+              </a:ext>
+            </a:extLst>
+          </p:cNvPr>
+          <p:cNvPicPr>
+            <a:picLocks noChangeAspect="1"/>
+          </p:cNvPicPr>
+          <p:nvPr/>
+        </p:nvPicPr>
+        <p:blipFill>
+          <a:blip r:embed="rId2"/>
+          <a:stretch>
+            <a:fillRect/>
+          </a:stretch>
+        </p:blipFill>
+        <p:spPr>
+          <a:xfrm>
+            <a:off x="304800" y="1267838"/>
+            <a:ext cx="15784285" cy="8339155"/>
+          </a:xfrm>
+          <a:prstGeom prst="rect">
+            <a:avLst/>
+          </a:prstGeom>
+        </p:spPr>
+      </p:pic>
     </p:spTree>
   </p:cSld>
   <p:clrMapOvr>
     <a:masterClrMapping/>
   </p:clrMapOvr>
-  <p:transition xmlns:p14="http://schemas.microsoft.com/office/powerpoint/2010/main" spd="med" advClick="1"/>
+  <p:transition spd="med"/>
 </p:sld>
 </file>
 
 <file path=ppt/slides/slide5.xml><?xml version="1.0" encoding="utf-8"?>
-<p:sld xmlns:a="http://schemas.openxmlformats.org/drawingml/2006/main" xmlns:r="http://schemas.openxmlformats.org/officeDocument/2006/relationships" xmlns:p="http://schemas.openxmlformats.org/presentationml/2006/main" xmlns:m="http://schemas.openxmlformats.org/officeDocument/2006/math" xmlns:a14="http://schemas.microsoft.com/office/drawing/2010/main" showMasterSp="1" showMasterPhAnim="1">
+<p:sld xmlns:a="http://schemas.openxmlformats.org/drawingml/2006/main" xmlns:r="http://schemas.openxmlformats.org/officeDocument/2006/relationships" xmlns:p="http://schemas.openxmlformats.org/presentationml/2006/main">
   <p:cSld>
     <p:spTree>
       <p:nvGrpSpPr>
@@ -4876,7 +4999,7 @@
               </a:cxnLst>
               <a:rect l="0" t="0" r="r" b="b"/>
               <a:pathLst>
-                <a:path w="21600" h="21600" fill="norm" stroke="1" extrusionOk="0">
+                <a:path w="21600" h="21600" extrusionOk="0">
                   <a:moveTo>
                     <a:pt x="10800" y="0"/>
                   </a:moveTo>
@@ -4919,7 +5042,7 @@
             </a:bodyPr>
             <a:lstStyle/>
             <a:p>
-              <a:pPr/>
+              <a:endParaRPr/>
             </a:p>
           </p:txBody>
         </p:sp>
@@ -4947,7 +5070,7 @@
             <a:effectLst/>
             <a:extLst>
               <a:ext uri="{C572A759-6A51-4108-AA02-DFA0A04FC94B}">
-                <ma14:wrappingTextBoxFlag xmlns:ma14="http://schemas.microsoft.com/office/mac/drawingml/2011/main" val="1"/>
+                <ma14:wrappingTextBoxFlag xmlns:ma14="http://schemas.microsoft.com/office/mac/drawingml/2011/main" xmlns:a14="http://schemas.microsoft.com/office/drawing/2010/main" xmlns:m="http://schemas.openxmlformats.org/officeDocument/2006/math" xmlns="" val="1"/>
               </a:ext>
             </a:extLst>
           </p:spPr>
@@ -4972,7 +5095,6 @@
               </a:lvl1pPr>
             </a:lstStyle>
             <a:p>
-              <a:pPr/>
               <a:r>
                 <a:t>5</a:t>
               </a:r>
@@ -4999,12 +5121,12 @@
           </a:ln>
           <a:extLst>
             <a:ext uri="{C572A759-6A51-4108-AA02-DFA0A04FC94B}">
-              <ma14:wrappingTextBoxFlag xmlns:ma14="http://schemas.microsoft.com/office/mac/drawingml/2011/main" val="1"/>
+              <ma14:wrappingTextBoxFlag xmlns:ma14="http://schemas.microsoft.com/office/mac/drawingml/2011/main" xmlns:a14="http://schemas.microsoft.com/office/drawing/2010/main" xmlns:m="http://schemas.openxmlformats.org/officeDocument/2006/math" xmlns="" val="1"/>
             </a:ext>
           </a:extLst>
         </p:spPr>
         <p:txBody>
-          <a:bodyPr lIns="0" tIns="0" rIns="0" bIns="0">
+          <a:bodyPr lIns="0" tIns="0" rIns="0" bIns="0" anchor="t">
             <a:spAutoFit/>
           </a:bodyPr>
           <a:lstStyle>
@@ -5021,24 +5143,54 @@
             </a:lvl1pPr>
           </a:lstStyle>
           <a:p>
-            <a:pPr/>
             <a:r>
-              <a:t>Server</a:t>
+              <a:rPr lang="en-US" dirty="0" err="1"/>
+              <a:t>dir_scan</a:t>
             </a:r>
           </a:p>
         </p:txBody>
       </p:sp>
+      <p:pic>
+        <p:nvPicPr>
+          <p:cNvPr id="2" name="Picture 2" descr="Text&#10;&#10;Description automatically generated">
+            <a:extLst>
+              <a:ext uri="{FF2B5EF4-FFF2-40B4-BE49-F238E27FC236}">
+                <a16:creationId xmlns:a16="http://schemas.microsoft.com/office/drawing/2014/main" id="{97D8EDF1-1110-4529-9EF5-9CB8FEAC79EF}"/>
+              </a:ext>
+            </a:extLst>
+          </p:cNvPr>
+          <p:cNvPicPr>
+            <a:picLocks noChangeAspect="1"/>
+          </p:cNvPicPr>
+          <p:nvPr/>
+        </p:nvPicPr>
+        <p:blipFill>
+          <a:blip r:embed="rId2"/>
+          <a:stretch>
+            <a:fillRect/>
+          </a:stretch>
+        </p:blipFill>
+        <p:spPr>
+          <a:xfrm>
+            <a:off x="293915" y="1297307"/>
+            <a:ext cx="11647714" cy="8454385"/>
+          </a:xfrm>
+          <a:prstGeom prst="rect">
+            <a:avLst/>
+          </a:prstGeom>
+        </p:spPr>
+      </p:pic>
     </p:spTree>
   </p:cSld>
   <p:clrMapOvr>
     <a:masterClrMapping/>
   </p:clrMapOvr>
-  <p:transition xmlns:p14="http://schemas.microsoft.com/office/powerpoint/2010/main" spd="med" advClick="1"/>
+  <p:transition spd="med"/>
 </p:sld>
 </file>
 
 <file path=ppt/slides/slide6.xml><?xml version="1.0" encoding="utf-8"?>
-<p:sld xmlns:a="http://schemas.openxmlformats.org/drawingml/2006/main" xmlns:r="http://schemas.openxmlformats.org/officeDocument/2006/relationships" xmlns:p="http://schemas.openxmlformats.org/presentationml/2006/main" xmlns:m="http://schemas.openxmlformats.org/officeDocument/2006/math" xmlns:a14="http://schemas.microsoft.com/office/drawing/2010/main" showMasterSp="1" showMasterPhAnim="1">
+<p:sld xmlns:a="http://schemas.openxmlformats.org/drawingml/2006/main" xmlns:r="http://schemas.openxmlformats.org/officeDocument/2006/relationships" xmlns:p="http://schemas.openxmlformats.org/presentationml/2006/main">
   <p:cSld>
     <p:spTree>
       <p:nvGrpSpPr>
@@ -5056,7 +5208,7 @@
       </p:grpSpPr>
       <p:sp>
         <p:nvSpPr>
-          <p:cNvPr id="144" name="Freeform 3"/>
+          <p:cNvPr id="151" name="Freeform 3"/>
           <p:cNvSpPr/>
           <p:nvPr/>
         </p:nvSpPr>
@@ -5079,27 +5231,27 @@
           <a:bodyPr lIns="45719" rIns="45719"/>
           <a:lstStyle/>
           <a:p>
-            <a:pPr/>
+            <a:endParaRPr/>
           </a:p>
         </p:txBody>
       </p:sp>
       <p:grpSp>
         <p:nvGrpSpPr>
-          <p:cNvPr id="147" name="Group 4"/>
+          <p:cNvPr id="154" name="Group 4"/>
           <p:cNvGrpSpPr/>
           <p:nvPr/>
         </p:nvGrpSpPr>
         <p:grpSpPr>
           <a:xfrm>
-            <a:off x="16661168" y="8740634"/>
-            <a:ext cx="1284202" cy="1289958"/>
+            <a:off x="16651643" y="8740634"/>
+            <a:ext cx="1284203" cy="1521916"/>
             <a:chOff x="0" y="0"/>
-            <a:chExt cx="1284201" cy="1289957"/>
+            <a:chExt cx="1284202" cy="1521915"/>
           </a:xfrm>
         </p:grpSpPr>
         <p:sp>
           <p:nvSpPr>
-            <p:cNvPr id="145" name="Freeform 6"/>
+            <p:cNvPr id="152" name="Freeform 6"/>
             <p:cNvSpPr/>
             <p:nvPr/>
           </p:nvSpPr>
@@ -5128,7 +5280,7 @@
               </a:cxnLst>
               <a:rect l="0" t="0" r="r" b="b"/>
               <a:pathLst>
-                <a:path w="21600" h="21600" fill="norm" stroke="1" extrusionOk="0">
+                <a:path w="21600" h="21600" extrusionOk="0">
                   <a:moveTo>
                     <a:pt x="10800" y="0"/>
                   </a:moveTo>
@@ -5171,20 +5323,20 @@
             </a:bodyPr>
             <a:lstStyle/>
             <a:p>
-              <a:pPr/>
+              <a:endParaRPr/>
             </a:p>
           </p:txBody>
         </p:sp>
         <p:sp>
           <p:nvSpPr>
-            <p:cNvPr id="146" name="TextBox 7"/>
+            <p:cNvPr id="153" name="TextBox 7"/>
             <p:cNvSpPr txBox="1"/>
             <p:nvPr/>
           </p:nvSpPr>
           <p:spPr>
             <a:xfrm>
-              <a:off x="519763" y="338114"/>
-              <a:ext cx="244674" cy="573906"/>
+              <a:off x="312403" y="357879"/>
+              <a:ext cx="659394" cy="1164036"/>
             </a:xfrm>
             <a:prstGeom prst="rect">
               <a:avLst/>
@@ -5197,7 +5349,7 @@
             <a:effectLst/>
             <a:extLst>
               <a:ext uri="{C572A759-6A51-4108-AA02-DFA0A04FC94B}">
-                <ma14:wrappingTextBoxFlag xmlns:ma14="http://schemas.microsoft.com/office/mac/drawingml/2011/main" val="1"/>
+                <ma14:wrappingTextBoxFlag xmlns:ma14="http://schemas.microsoft.com/office/mac/drawingml/2011/main" xmlns:a14="http://schemas.microsoft.com/office/drawing/2010/main" xmlns:m="http://schemas.openxmlformats.org/officeDocument/2006/math" xmlns="" val="1"/>
               </a:ext>
             </a:extLst>
           </p:spPr>
@@ -5222,311 +5374,13 @@
               </a:lvl1pPr>
             </a:lstStyle>
             <a:p>
-              <a:pPr/>
               <a:r>
+                <a:rPr lang="en-US" dirty="0"/>
                 <a:t>6</a:t>
               </a:r>
             </a:p>
-          </p:txBody>
-        </p:sp>
-      </p:grpSp>
-      <p:sp>
-        <p:nvSpPr>
-          <p:cNvPr id="148" name="TextBox 9"/>
-          <p:cNvSpPr txBox="1"/>
-          <p:nvPr/>
-        </p:nvSpPr>
-        <p:spPr>
-          <a:xfrm>
-            <a:off x="218261" y="222912"/>
-            <a:ext cx="5795442" cy="880479"/>
-          </a:xfrm>
-          <a:prstGeom prst="rect">
-            <a:avLst/>
-          </a:prstGeom>
-          <a:ln w="12700">
-            <a:miter lim="400000"/>
-          </a:ln>
-          <a:extLst>
-            <a:ext uri="{C572A759-6A51-4108-AA02-DFA0A04FC94B}">
-              <ma14:wrappingTextBoxFlag xmlns:ma14="http://schemas.microsoft.com/office/mac/drawingml/2011/main" val="1"/>
-            </a:ext>
-          </a:extLst>
-        </p:spPr>
-        <p:txBody>
-          <a:bodyPr lIns="0" tIns="0" rIns="0" bIns="0">
-            <a:spAutoFit/>
-          </a:bodyPr>
-          <a:lstStyle>
-            <a:lvl1pPr>
-              <a:lnSpc>
-                <a:spcPts val="7200"/>
-              </a:lnSpc>
-              <a:defRPr sz="5100">
-                <a:latin typeface="Open Sans"/>
-                <a:ea typeface="Open Sans"/>
-                <a:cs typeface="Open Sans"/>
-                <a:sym typeface="Open Sans"/>
-              </a:defRPr>
-            </a:lvl1pPr>
-          </a:lstStyle>
-          <a:p>
-            <a:pPr/>
-            <a:r>
-              <a:t>Conta</a:t>
-            </a:r>
-          </a:p>
-        </p:txBody>
-      </p:sp>
-      <p:sp>
-        <p:nvSpPr>
-          <p:cNvPr id="149" name="TextBox 9"/>
-          <p:cNvSpPr txBox="1"/>
-          <p:nvPr/>
-        </p:nvSpPr>
-        <p:spPr>
-          <a:xfrm>
-            <a:off x="9144000" y="203518"/>
-            <a:ext cx="8899505" cy="871718"/>
-          </a:xfrm>
-          <a:prstGeom prst="rect">
-            <a:avLst/>
-          </a:prstGeom>
-          <a:ln w="12700">
-            <a:miter lim="400000"/>
-          </a:ln>
-          <a:extLst>
-            <a:ext uri="{C572A759-6A51-4108-AA02-DFA0A04FC94B}">
-              <ma14:wrappingTextBoxFlag xmlns:ma14="http://schemas.microsoft.com/office/mac/drawingml/2011/main" val="1"/>
-            </a:ext>
-          </a:extLst>
-        </p:spPr>
-        <p:txBody>
-          <a:bodyPr lIns="0" tIns="0" rIns="0" bIns="0">
-            <a:spAutoFit/>
-          </a:bodyPr>
-          <a:lstStyle>
-            <a:lvl1pPr>
-              <a:lnSpc>
-                <a:spcPts val="7200"/>
-              </a:lnSpc>
-              <a:defRPr sz="4800">
-                <a:solidFill>
-                  <a:srgbClr val="FFFFFF"/>
-                </a:solidFill>
-                <a:latin typeface="Open Sans"/>
-                <a:ea typeface="Open Sans"/>
-                <a:cs typeface="Open Sans"/>
-                <a:sym typeface="Open Sans"/>
-              </a:defRPr>
-            </a:lvl1pPr>
-          </a:lstStyle>
-          <a:p>
-            <a:pPr/>
-            <a:r>
-              <a:t>Conta_file</a:t>
-            </a:r>
-          </a:p>
-        </p:txBody>
-      </p:sp>
-    </p:spTree>
-  </p:cSld>
-  <p:clrMapOvr>
-    <a:masterClrMapping/>
-  </p:clrMapOvr>
-  <p:transition xmlns:p14="http://schemas.microsoft.com/office/powerpoint/2010/main" spd="med" advClick="1"/>
-</p:sld>
-</file>
-
-<file path=ppt/slides/slide7.xml><?xml version="1.0" encoding="utf-8"?>
-<p:sld xmlns:a="http://schemas.openxmlformats.org/drawingml/2006/main" xmlns:r="http://schemas.openxmlformats.org/officeDocument/2006/relationships" xmlns:p="http://schemas.openxmlformats.org/presentationml/2006/main" xmlns:m="http://schemas.openxmlformats.org/officeDocument/2006/math" xmlns:a14="http://schemas.microsoft.com/office/drawing/2010/main" showMasterSp="1" showMasterPhAnim="1">
-  <p:cSld>
-    <p:spTree>
-      <p:nvGrpSpPr>
-        <p:cNvPr id="1" name=""/>
-        <p:cNvGrpSpPr/>
-        <p:nvPr/>
-      </p:nvGrpSpPr>
-      <p:grpSpPr>
-        <a:xfrm>
-          <a:off x="0" y="0"/>
-          <a:ext cx="0" cy="0"/>
-          <a:chOff x="0" y="0"/>
-          <a:chExt cx="0" cy="0"/>
-        </a:xfrm>
-      </p:grpSpPr>
-      <p:sp>
-        <p:nvSpPr>
-          <p:cNvPr id="151" name="Freeform 3"/>
-          <p:cNvSpPr/>
-          <p:nvPr/>
-        </p:nvSpPr>
-        <p:spPr>
-          <a:xfrm>
-            <a:off x="8629649" y="0"/>
-            <a:ext cx="9658351" cy="10287001"/>
-          </a:xfrm>
-          <a:prstGeom prst="rect">
-            <a:avLst/>
-          </a:prstGeom>
-          <a:solidFill>
-            <a:srgbClr val="004AAD"/>
-          </a:solidFill>
-          <a:ln w="12700">
-            <a:miter lim="400000"/>
-          </a:ln>
-        </p:spPr>
-        <p:txBody>
-          <a:bodyPr lIns="45719" rIns="45719"/>
-          <a:lstStyle/>
-          <a:p>
-            <a:pPr/>
-          </a:p>
-        </p:txBody>
-      </p:sp>
-      <p:grpSp>
-        <p:nvGrpSpPr>
-          <p:cNvPr id="154" name="Group 4"/>
-          <p:cNvGrpSpPr/>
-          <p:nvPr/>
-        </p:nvGrpSpPr>
-        <p:grpSpPr>
-          <a:xfrm>
-            <a:off x="16651643" y="8740634"/>
-            <a:ext cx="1284202" cy="1289958"/>
-            <a:chOff x="0" y="0"/>
-            <a:chExt cx="1284201" cy="1289957"/>
-          </a:xfrm>
-        </p:grpSpPr>
-        <p:sp>
-          <p:nvSpPr>
-            <p:cNvPr id="152" name="Freeform 6"/>
-            <p:cNvSpPr/>
-            <p:nvPr/>
-          </p:nvSpPr>
-          <p:spPr>
-            <a:xfrm>
-              <a:off x="0" y="0"/>
-              <a:ext cx="1284202" cy="1289958"/>
-            </a:xfrm>
-            <a:custGeom>
-              <a:avLst/>
-              <a:gdLst/>
-              <a:ahLst/>
-              <a:cxnLst>
-                <a:cxn ang="0">
-                  <a:pos x="wd2" y="hd2"/>
-                </a:cxn>
-                <a:cxn ang="5400000">
-                  <a:pos x="wd2" y="hd2"/>
-                </a:cxn>
-                <a:cxn ang="10800000">
-                  <a:pos x="wd2" y="hd2"/>
-                </a:cxn>
-                <a:cxn ang="16200000">
-                  <a:pos x="wd2" y="hd2"/>
-                </a:cxn>
-              </a:cxnLst>
-              <a:rect l="0" t="0" r="r" b="b"/>
-              <a:pathLst>
-                <a:path w="21600" h="21600" fill="norm" stroke="1" extrusionOk="0">
-                  <a:moveTo>
-                    <a:pt x="10800" y="0"/>
-                  </a:moveTo>
-                  <a:cubicBezTo>
-                    <a:pt x="16772" y="27"/>
-                    <a:pt x="21600" y="4854"/>
-                    <a:pt x="21600" y="10800"/>
-                  </a:cubicBezTo>
-                  <a:cubicBezTo>
-                    <a:pt x="21600" y="16746"/>
-                    <a:pt x="16772" y="21573"/>
-                    <a:pt x="10800" y="21600"/>
-                  </a:cubicBezTo>
-                  <a:cubicBezTo>
-                    <a:pt x="4828" y="21573"/>
-                    <a:pt x="0" y="16746"/>
-                    <a:pt x="0" y="10800"/>
-                  </a:cubicBezTo>
-                  <a:cubicBezTo>
-                    <a:pt x="0" y="4854"/>
-                    <a:pt x="4828" y="27"/>
-                    <a:pt x="10800" y="0"/>
-                  </a:cubicBezTo>
-                  <a:close/>
-                </a:path>
-              </a:pathLst>
-            </a:custGeom>
-            <a:solidFill>
-              <a:srgbClr val="FF914D"/>
-            </a:solidFill>
-            <a:ln w="12700" cap="flat">
-              <a:noFill/>
-              <a:miter lim="400000"/>
-            </a:ln>
-            <a:effectLst/>
-          </p:spPr>
-          <p:txBody>
-            <a:bodyPr wrap="square" lIns="45719" tIns="45719" rIns="45719" bIns="45719" numCol="1" anchor="t">
-              <a:noAutofit/>
-            </a:bodyPr>
-            <a:lstStyle/>
             <a:p>
-              <a:pPr/>
-            </a:p>
-          </p:txBody>
-        </p:sp>
-        <p:sp>
-          <p:nvSpPr>
-            <p:cNvPr id="153" name="TextBox 7"/>
-            <p:cNvSpPr txBox="1"/>
-            <p:nvPr/>
-          </p:nvSpPr>
-          <p:spPr>
-            <a:xfrm>
-              <a:off x="312403" y="357879"/>
-              <a:ext cx="659394" cy="573906"/>
-            </a:xfrm>
-            <a:prstGeom prst="rect">
-              <a:avLst/>
-            </a:prstGeom>
-            <a:noFill/>
-            <a:ln w="12700" cap="flat">
-              <a:noFill/>
-              <a:miter lim="400000"/>
-            </a:ln>
-            <a:effectLst/>
-            <a:extLst>
-              <a:ext uri="{C572A759-6A51-4108-AA02-DFA0A04FC94B}">
-                <ma14:wrappingTextBoxFlag xmlns:ma14="http://schemas.microsoft.com/office/mac/drawingml/2011/main" val="1"/>
-              </a:ext>
-            </a:extLst>
-          </p:spPr>
-          <p:txBody>
-            <a:bodyPr wrap="square" lIns="0" tIns="0" rIns="0" bIns="0" numCol="1" anchor="t">
-              <a:spAutoFit/>
-            </a:bodyPr>
-            <a:lstStyle>
-              <a:lvl1pPr algn="ctr">
-                <a:lnSpc>
-                  <a:spcPts val="4700"/>
-                </a:lnSpc>
-                <a:defRPr sz="3300">
-                  <a:solidFill>
-                    <a:srgbClr val="FFFFFF"/>
-                  </a:solidFill>
-                  <a:latin typeface="Open Sans Light Bold"/>
-                  <a:ea typeface="Open Sans Light Bold"/>
-                  <a:cs typeface="Open Sans Light Bold"/>
-                  <a:sym typeface="Open Sans Light Bold"/>
-                </a:defRPr>
-              </a:lvl1pPr>
-            </a:lstStyle>
-            <a:p>
-              <a:pPr/>
-              <a:r>
-                <a:t>7</a:t>
-              </a:r>
+              <a:endParaRPr lang="en-US" dirty="0"/>
             </a:p>
           </p:txBody>
         </p:sp>
@@ -5540,9 +5394,7 @@
           <p:nvPr/>
         </p:nvPicPr>
         <p:blipFill>
-          <a:blip r:embed="rId2">
-            <a:extLst/>
-          </a:blip>
+          <a:blip r:embed="rId2"/>
           <a:stretch>
             <a:fillRect/>
           </a:stretch>
@@ -5569,9 +5421,7 @@
           <p:nvPr/>
         </p:nvPicPr>
         <p:blipFill>
-          <a:blip r:embed="rId3">
-            <a:extLst/>
-          </a:blip>
+          <a:blip r:embed="rId3"/>
           <a:stretch>
             <a:fillRect/>
           </a:stretch>
@@ -5598,9 +5448,7 @@
           <p:nvPr/>
         </p:nvPicPr>
         <p:blipFill>
-          <a:blip r:embed="rId4">
-            <a:extLst/>
-          </a:blip>
+          <a:blip r:embed="rId4"/>
           <a:stretch>
             <a:fillRect/>
           </a:stretch>
@@ -5627,9 +5475,7 @@
           <p:nvPr/>
         </p:nvPicPr>
         <p:blipFill>
-          <a:blip r:embed="rId5">
-            <a:extLst/>
-          </a:blip>
+          <a:blip r:embed="rId5"/>
           <a:stretch>
             <a:fillRect/>
           </a:stretch>
@@ -5656,9 +5502,7 @@
           <p:nvPr/>
         </p:nvPicPr>
         <p:blipFill>
-          <a:blip r:embed="rId6">
-            <a:extLst/>
-          </a:blip>
+          <a:blip r:embed="rId6"/>
           <a:stretch>
             <a:fillRect/>
           </a:stretch>
@@ -5685,9 +5529,7 @@
           <p:nvPr/>
         </p:nvPicPr>
         <p:blipFill>
-          <a:blip r:embed="rId7">
-            <a:extLst/>
-          </a:blip>
+          <a:blip r:embed="rId7"/>
           <a:stretch>
             <a:fillRect/>
           </a:stretch>
@@ -5724,7 +5566,7 @@
           </a:ln>
           <a:extLst>
             <a:ext uri="{C572A759-6A51-4108-AA02-DFA0A04FC94B}">
-              <ma14:wrappingTextBoxFlag xmlns:ma14="http://schemas.microsoft.com/office/mac/drawingml/2011/main" val="1"/>
+              <ma14:wrappingTextBoxFlag xmlns:ma14="http://schemas.microsoft.com/office/mac/drawingml/2011/main" xmlns:a14="http://schemas.microsoft.com/office/drawing/2010/main" xmlns:m="http://schemas.openxmlformats.org/officeDocument/2006/math" xmlns="" val="1"/>
             </a:ext>
           </a:extLst>
         </p:spPr>
@@ -5746,7 +5588,6 @@
             </a:lvl1pPr>
           </a:lstStyle>
           <a:p>
-            <a:pPr/>
             <a:r>
               <a:t>Gestione progetto</a:t>
             </a:r>
@@ -5772,7 +5613,7 @@
           </a:ln>
           <a:extLst>
             <a:ext uri="{C572A759-6A51-4108-AA02-DFA0A04FC94B}">
-              <ma14:wrappingTextBoxFlag xmlns:ma14="http://schemas.microsoft.com/office/mac/drawingml/2011/main" val="1"/>
+              <ma14:wrappingTextBoxFlag xmlns:ma14="http://schemas.microsoft.com/office/mac/drawingml/2011/main" xmlns:a14="http://schemas.microsoft.com/office/drawing/2010/main" xmlns:m="http://schemas.openxmlformats.org/officeDocument/2006/math" xmlns="" val="1"/>
             </a:ext>
           </a:extLst>
         </p:spPr>
@@ -5794,7 +5635,6 @@
             </a:lvl1pPr>
           </a:lstStyle>
           <a:p>
-            <a:pPr/>
             <a:r>
               <a:t>Coding</a:t>
             </a:r>
@@ -5820,7 +5660,7 @@
           </a:ln>
           <a:extLst>
             <a:ext uri="{C572A759-6A51-4108-AA02-DFA0A04FC94B}">
-              <ma14:wrappingTextBoxFlag xmlns:ma14="http://schemas.microsoft.com/office/mac/drawingml/2011/main" val="1"/>
+              <ma14:wrappingTextBoxFlag xmlns:ma14="http://schemas.microsoft.com/office/mac/drawingml/2011/main" xmlns:a14="http://schemas.microsoft.com/office/drawing/2010/main" xmlns:m="http://schemas.openxmlformats.org/officeDocument/2006/math" xmlns="" val="1"/>
             </a:ext>
           </a:extLst>
         </p:spPr>
@@ -5845,7 +5685,6 @@
             </a:lvl1pPr>
           </a:lstStyle>
           <a:p>
-            <a:pPr/>
             <a:r>
               <a:t>Team</a:t>
             </a:r>
@@ -5857,12 +5696,12 @@
   <p:clrMapOvr>
     <a:masterClrMapping/>
   </p:clrMapOvr>
-  <p:transition xmlns:p14="http://schemas.microsoft.com/office/powerpoint/2010/main" spd="med" advClick="1"/>
+  <p:transition spd="med"/>
 </p:sld>
 </file>
 
-<file path=ppt/slides/slide8.xml><?xml version="1.0" encoding="utf-8"?>
-<p:sld xmlns:a="http://schemas.openxmlformats.org/drawingml/2006/main" xmlns:r="http://schemas.openxmlformats.org/officeDocument/2006/relationships" xmlns:p="http://schemas.openxmlformats.org/presentationml/2006/main" xmlns:m="http://schemas.openxmlformats.org/officeDocument/2006/math" xmlns:a14="http://schemas.microsoft.com/office/drawing/2010/main" showMasterSp="1" showMasterPhAnim="1">
+<file path=ppt/slides/slide7.xml><?xml version="1.0" encoding="utf-8"?>
+<p:sld xmlns:a="http://schemas.openxmlformats.org/drawingml/2006/main" xmlns:r="http://schemas.openxmlformats.org/officeDocument/2006/relationships" xmlns:p="http://schemas.openxmlformats.org/presentationml/2006/main">
   <p:cSld>
     <p:spTree>
       <p:nvGrpSpPr>
@@ -5903,7 +5742,7 @@
           <a:bodyPr lIns="45719" rIns="45719"/>
           <a:lstStyle/>
           <a:p>
-            <a:pPr/>
+            <a:endParaRPr/>
           </a:p>
         </p:txBody>
       </p:sp>
@@ -5916,9 +5755,7 @@
           <p:nvPr/>
         </p:nvPicPr>
         <p:blipFill>
-          <a:blip r:embed="rId2">
-            <a:extLst/>
-          </a:blip>
+          <a:blip r:embed="rId2"/>
           <a:stretch>
             <a:fillRect/>
           </a:stretch>
@@ -5955,7 +5792,7 @@
           </a:ln>
           <a:extLst>
             <a:ext uri="{C572A759-6A51-4108-AA02-DFA0A04FC94B}">
-              <ma14:wrappingTextBoxFlag xmlns:ma14="http://schemas.microsoft.com/office/mac/drawingml/2011/main" val="1"/>
+              <ma14:wrappingTextBoxFlag xmlns:ma14="http://schemas.microsoft.com/office/mac/drawingml/2011/main" xmlns:a14="http://schemas.microsoft.com/office/drawing/2010/main" xmlns:m="http://schemas.openxmlformats.org/officeDocument/2006/math" xmlns="" val="1"/>
             </a:ext>
           </a:extLst>
         </p:spPr>
@@ -5977,7 +5814,6 @@
             </a:lvl1pPr>
           </a:lstStyle>
           <a:p>
-            <a:pPr/>
             <a:r>
               <a:t>Grazie!</a:t>
             </a:r>
@@ -6003,7 +5839,7 @@
           </a:ln>
           <a:extLst>
             <a:ext uri="{C572A759-6A51-4108-AA02-DFA0A04FC94B}">
-              <ma14:wrappingTextBoxFlag xmlns:ma14="http://schemas.microsoft.com/office/mac/drawingml/2011/main" val="1"/>
+              <ma14:wrappingTextBoxFlag xmlns:ma14="http://schemas.microsoft.com/office/mac/drawingml/2011/main" xmlns:a14="http://schemas.microsoft.com/office/drawing/2010/main" xmlns:m="http://schemas.openxmlformats.org/officeDocument/2006/math" xmlns="" val="1"/>
             </a:ext>
           </a:extLst>
         </p:spPr>
@@ -6109,7 +5945,7 @@
           </a:ln>
           <a:extLst>
             <a:ext uri="{C572A759-6A51-4108-AA02-DFA0A04FC94B}">
-              <ma14:wrappingTextBoxFlag xmlns:ma14="http://schemas.microsoft.com/office/mac/drawingml/2011/main" val="1"/>
+              <ma14:wrappingTextBoxFlag xmlns:ma14="http://schemas.microsoft.com/office/mac/drawingml/2011/main" xmlns:a14="http://schemas.microsoft.com/office/drawing/2010/main" xmlns:m="http://schemas.openxmlformats.org/officeDocument/2006/math" xmlns="" val="1"/>
             </a:ext>
           </a:extLst>
         </p:spPr>
@@ -6131,7 +5967,6 @@
             </a:lvl1pPr>
           </a:lstStyle>
           <a:p>
-            <a:pPr/>
             <a:r>
               <a:t>7 Dicembre 2021</a:t>
             </a:r>
@@ -6183,7 +6018,7 @@
               </a:cxnLst>
               <a:rect l="0" t="0" r="r" b="b"/>
               <a:pathLst>
-                <a:path w="21600" h="21600" fill="norm" stroke="1" extrusionOk="0">
+                <a:path w="21600" h="21600" extrusionOk="0">
                   <a:moveTo>
                     <a:pt x="10800" y="0"/>
                   </a:moveTo>
@@ -6226,7 +6061,7 @@
             </a:bodyPr>
             <a:lstStyle/>
             <a:p>
-              <a:pPr/>
+              <a:endParaRPr/>
             </a:p>
           </p:txBody>
         </p:sp>
@@ -6252,7 +6087,7 @@
             <a:effectLst/>
             <a:extLst>
               <a:ext uri="{C572A759-6A51-4108-AA02-DFA0A04FC94B}">
-                <ma14:wrappingTextBoxFlag xmlns:ma14="http://schemas.microsoft.com/office/mac/drawingml/2011/main" val="1"/>
+                <ma14:wrappingTextBoxFlag xmlns:ma14="http://schemas.microsoft.com/office/mac/drawingml/2011/main" xmlns:a14="http://schemas.microsoft.com/office/drawing/2010/main" xmlns:m="http://schemas.openxmlformats.org/officeDocument/2006/math" xmlns="" val="1"/>
               </a:ext>
             </a:extLst>
           </p:spPr>
@@ -6277,9 +6112,9 @@
               </a:lvl1pPr>
             </a:lstStyle>
             <a:p>
-              <a:pPr/>
               <a:r>
-                <a:t>8</a:t>
+                <a:rPr lang="en-US" dirty="0"/>
+                <a:t>7</a:t>
               </a:r>
             </a:p>
           </p:txBody>
@@ -6290,12 +6125,12 @@
   <p:clrMapOvr>
     <a:masterClrMapping/>
   </p:clrMapOvr>
-  <p:transition xmlns:p14="http://schemas.microsoft.com/office/powerpoint/2010/main" spd="med" advClick="1"/>
+  <p:transition spd="med"/>
 </p:sld>
 </file>
 
 <file path=ppt/theme/theme1.xml><?xml version="1.0" encoding="utf-8"?>
-<a:theme xmlns:a="http://schemas.openxmlformats.org/drawingml/2006/main" xmlns:r="http://schemas.openxmlformats.org/officeDocument/2006/relationships" name="Office Theme">
+<a:theme xmlns:a="http://schemas.openxmlformats.org/drawingml/2006/main" name="Office Theme">
   <a:themeElements>
     <a:clrScheme name="Office Theme">
       <a:dk1>
@@ -6421,7 +6256,7 @@
       <a:effectStyleLst>
         <a:effectStyle>
           <a:effectLst>
-            <a:outerShdw sx="100000" sy="100000" kx="0" ky="0" algn="b" rotWithShape="0" blurRad="38100" dist="23000" dir="5400000">
+            <a:outerShdw blurRad="38100" dist="23000" dir="5400000" rotWithShape="0">
               <a:srgbClr val="000000">
                 <a:alpha val="35000"/>
               </a:srgbClr>
@@ -6430,7 +6265,7 @@
         </a:effectStyle>
         <a:effectStyle>
           <a:effectLst>
-            <a:outerShdw sx="100000" sy="100000" kx="0" ky="0" algn="b" rotWithShape="0" blurRad="38100" dist="23000" dir="5400000">
+            <a:outerShdw blurRad="38100" dist="23000" dir="5400000" rotWithShape="0">
               <a:srgbClr val="000000">
                 <a:alpha val="35000"/>
               </a:srgbClr>
@@ -6439,7 +6274,7 @@
         </a:effectStyle>
         <a:effectStyle>
           <a:effectLst>
-            <a:outerShdw sx="100000" sy="100000" kx="0" ky="0" algn="b" rotWithShape="0" blurRad="38100" dist="20000" dir="5400000">
+            <a:outerShdw blurRad="38100" dist="20000" dir="5400000" rotWithShape="0">
               <a:srgbClr val="000000">
                 <a:alpha val="38000"/>
               </a:srgbClr>
@@ -6513,7 +6348,7 @@
           <a:round/>
         </a:ln>
         <a:effectLst>
-          <a:outerShdw sx="100000" sy="100000" kx="0" ky="0" algn="b" rotWithShape="0" blurRad="38100" dist="23000" dir="5400000">
+          <a:outerShdw blurRad="38100" dist="23000" dir="5400000" rotWithShape="0">
             <a:srgbClr val="000000">
               <a:alpha val="35000"/>
             </a:srgbClr>
@@ -6521,7 +6356,7 @@
         </a:effectLst>
         <a:sp3d/>
       </a:spPr>
-      <a:bodyPr rot="0" spcFirstLastPara="1" vertOverflow="overflow" horzOverflow="overflow" vert="horz" wrap="square" lIns="45719" tIns="45719" rIns="45719" bIns="45719" numCol="1" spcCol="38100" rtlCol="0" anchor="ctr" upright="0">
+      <a:bodyPr rot="0" spcFirstLastPara="1" vertOverflow="overflow" horzOverflow="overflow" vert="horz" wrap="square" lIns="45719" tIns="45719" rIns="45719" bIns="45719" numCol="1" spcCol="38100" rtlCol="0" anchor="ctr">
         <a:spAutoFit/>
       </a:bodyPr>
       <a:lstStyle>
@@ -6540,7 +6375,7 @@
           <a:buFontTx/>
           <a:buNone/>
           <a:tabLst/>
-          <a:defRPr b="0" baseline="0" cap="none" i="0" spc="0" strike="noStrike" sz="1800" u="none" kumimoji="0" normalizeH="0">
+          <a:defRPr kumimoji="0" sz="1800" b="0" i="0" u="none" strike="noStrike" cap="none" spc="0" normalizeH="0" baseline="0">
             <a:ln>
               <a:noFill/>
             </a:ln>
@@ -6570,7 +6405,7 @@
           <a:buFontTx/>
           <a:buNone/>
           <a:tabLst/>
-          <a:defRPr b="0" baseline="0" cap="none" i="0" spc="0" strike="noStrike" sz="1800" u="none" kumimoji="0" normalizeH="0">
+          <a:defRPr kumimoji="0" sz="1800" b="0" i="0" u="none" strike="noStrike" cap="none" spc="0" normalizeH="0" baseline="0">
             <a:ln>
               <a:noFill/>
             </a:ln>
@@ -6596,7 +6431,7 @@
           <a:buFontTx/>
           <a:buNone/>
           <a:tabLst/>
-          <a:defRPr b="0" baseline="0" cap="none" i="0" spc="0" strike="noStrike" sz="1800" u="none" kumimoji="0" normalizeH="0">
+          <a:defRPr kumimoji="0" sz="1800" b="0" i="0" u="none" strike="noStrike" cap="none" spc="0" normalizeH="0" baseline="0">
             <a:ln>
               <a:noFill/>
             </a:ln>
@@ -6622,7 +6457,7 @@
           <a:buFontTx/>
           <a:buNone/>
           <a:tabLst/>
-          <a:defRPr b="0" baseline="0" cap="none" i="0" spc="0" strike="noStrike" sz="1800" u="none" kumimoji="0" normalizeH="0">
+          <a:defRPr kumimoji="0" sz="1800" b="0" i="0" u="none" strike="noStrike" cap="none" spc="0" normalizeH="0" baseline="0">
             <a:ln>
               <a:noFill/>
             </a:ln>
@@ -6648,7 +6483,7 @@
           <a:buFontTx/>
           <a:buNone/>
           <a:tabLst/>
-          <a:defRPr b="0" baseline="0" cap="none" i="0" spc="0" strike="noStrike" sz="1800" u="none" kumimoji="0" normalizeH="0">
+          <a:defRPr kumimoji="0" sz="1800" b="0" i="0" u="none" strike="noStrike" cap="none" spc="0" normalizeH="0" baseline="0">
             <a:ln>
               <a:noFill/>
             </a:ln>
@@ -6674,7 +6509,7 @@
           <a:buFontTx/>
           <a:buNone/>
           <a:tabLst/>
-          <a:defRPr b="0" baseline="0" cap="none" i="0" spc="0" strike="noStrike" sz="1800" u="none" kumimoji="0" normalizeH="0">
+          <a:defRPr kumimoji="0" sz="1800" b="0" i="0" u="none" strike="noStrike" cap="none" spc="0" normalizeH="0" baseline="0">
             <a:ln>
               <a:noFill/>
             </a:ln>
@@ -6700,7 +6535,7 @@
           <a:buFontTx/>
           <a:buNone/>
           <a:tabLst/>
-          <a:defRPr b="0" baseline="0" cap="none" i="0" spc="0" strike="noStrike" sz="1800" u="none" kumimoji="0" normalizeH="0">
+          <a:defRPr kumimoji="0" sz="1800" b="0" i="0" u="none" strike="noStrike" cap="none" spc="0" normalizeH="0" baseline="0">
             <a:ln>
               <a:noFill/>
             </a:ln>
@@ -6726,7 +6561,7 @@
           <a:buFontTx/>
           <a:buNone/>
           <a:tabLst/>
-          <a:defRPr b="0" baseline="0" cap="none" i="0" spc="0" strike="noStrike" sz="1800" u="none" kumimoji="0" normalizeH="0">
+          <a:defRPr kumimoji="0" sz="1800" b="0" i="0" u="none" strike="noStrike" cap="none" spc="0" normalizeH="0" baseline="0">
             <a:ln>
               <a:noFill/>
             </a:ln>
@@ -6752,7 +6587,7 @@
           <a:buFontTx/>
           <a:buNone/>
           <a:tabLst/>
-          <a:defRPr b="0" baseline="0" cap="none" i="0" spc="0" strike="noStrike" sz="1800" u="none" kumimoji="0" normalizeH="0">
+          <a:defRPr kumimoji="0" sz="1800" b="0" i="0" u="none" strike="noStrike" cap="none" spc="0" normalizeH="0" baseline="0">
             <a:ln>
               <a:noFill/>
             </a:ln>
@@ -6778,7 +6613,7 @@
           <a:buFontTx/>
           <a:buNone/>
           <a:tabLst/>
-          <a:defRPr b="0" baseline="0" cap="none" i="0" spc="0" strike="noStrike" sz="1800" u="none" kumimoji="0" normalizeH="0">
+          <a:defRPr kumimoji="0" sz="1800" b="0" i="0" u="none" strike="noStrike" cap="none" spc="0" normalizeH="0" baseline="0">
             <a:ln>
               <a:noFill/>
             </a:ln>
@@ -6791,9 +6626,15 @@
         </a:lvl9pPr>
       </a:lstStyle>
       <a:style>
-        <a:lnRef idx="0"/>
-        <a:fillRef idx="0"/>
-        <a:effectRef idx="0"/>
+        <a:lnRef idx="0">
+          <a:scrgbClr r="0" g="0" b="0"/>
+        </a:lnRef>
+        <a:fillRef idx="0">
+          <a:scrgbClr r="0" g="0" b="0"/>
+        </a:fillRef>
+        <a:effectRef idx="0">
+          <a:scrgbClr r="0" g="0" b="0"/>
+        </a:effectRef>
         <a:fontRef idx="none"/>
       </a:style>
     </a:spDef>
@@ -6808,7 +6649,7 @@
           <a:round/>
         </a:ln>
         <a:effectLst>
-          <a:outerShdw sx="100000" sy="100000" kx="0" ky="0" algn="b" rotWithShape="0" blurRad="38100" dist="20000" dir="5400000">
+          <a:outerShdw blurRad="38100" dist="20000" dir="5400000" rotWithShape="0">
             <a:srgbClr val="000000">
               <a:alpha val="38000"/>
             </a:srgbClr>
@@ -6816,7 +6657,7 @@
         </a:effectLst>
         <a:sp3d/>
       </a:spPr>
-      <a:bodyPr rot="0" spcFirstLastPara="1" vertOverflow="overflow" horzOverflow="overflow" vert="horz" wrap="square" lIns="91439" tIns="45719" rIns="91439" bIns="45719" numCol="1" spcCol="38100" rtlCol="0" anchor="t" upright="0">
+      <a:bodyPr rot="0" spcFirstLastPara="1" vertOverflow="overflow" horzOverflow="overflow" vert="horz" wrap="square" lIns="91439" tIns="45719" rIns="91439" bIns="45719" numCol="1" spcCol="38100" rtlCol="0" anchor="t">
         <a:noAutofit/>
       </a:bodyPr>
       <a:lstStyle>
@@ -6835,7 +6676,7 @@
           <a:buFontTx/>
           <a:buNone/>
           <a:tabLst/>
-          <a:defRPr b="0" baseline="0" cap="none" i="0" spc="0" strike="noStrike" sz="1800" u="none" kumimoji="0" normalizeH="0">
+          <a:defRPr kumimoji="0" sz="1800" b="0" i="0" u="none" strike="noStrike" cap="none" spc="0" normalizeH="0" baseline="0">
             <a:ln>
               <a:noFill/>
             </a:ln>
@@ -6861,7 +6702,7 @@
           <a:buFontTx/>
           <a:buNone/>
           <a:tabLst/>
-          <a:defRPr b="0" baseline="0" cap="none" i="0" spc="0" strike="noStrike" sz="1800" u="none" kumimoji="0" normalizeH="0">
+          <a:defRPr kumimoji="0" sz="1800" b="0" i="0" u="none" strike="noStrike" cap="none" spc="0" normalizeH="0" baseline="0">
             <a:ln>
               <a:noFill/>
             </a:ln>
@@ -6887,7 +6728,7 @@
           <a:buFontTx/>
           <a:buNone/>
           <a:tabLst/>
-          <a:defRPr b="0" baseline="0" cap="none" i="0" spc="0" strike="noStrike" sz="1800" u="none" kumimoji="0" normalizeH="0">
+          <a:defRPr kumimoji="0" sz="1800" b="0" i="0" u="none" strike="noStrike" cap="none" spc="0" normalizeH="0" baseline="0">
             <a:ln>
               <a:noFill/>
             </a:ln>
@@ -6913,7 +6754,7 @@
           <a:buFontTx/>
           <a:buNone/>
           <a:tabLst/>
-          <a:defRPr b="0" baseline="0" cap="none" i="0" spc="0" strike="noStrike" sz="1800" u="none" kumimoji="0" normalizeH="0">
+          <a:defRPr kumimoji="0" sz="1800" b="0" i="0" u="none" strike="noStrike" cap="none" spc="0" normalizeH="0" baseline="0">
             <a:ln>
               <a:noFill/>
             </a:ln>
@@ -6939,7 +6780,7 @@
           <a:buFontTx/>
           <a:buNone/>
           <a:tabLst/>
-          <a:defRPr b="0" baseline="0" cap="none" i="0" spc="0" strike="noStrike" sz="1800" u="none" kumimoji="0" normalizeH="0">
+          <a:defRPr kumimoji="0" sz="1800" b="0" i="0" u="none" strike="noStrike" cap="none" spc="0" normalizeH="0" baseline="0">
             <a:ln>
               <a:noFill/>
             </a:ln>
@@ -6965,7 +6806,7 @@
           <a:buFontTx/>
           <a:buNone/>
           <a:tabLst/>
-          <a:defRPr b="0" baseline="0" cap="none" i="0" spc="0" strike="noStrike" sz="1800" u="none" kumimoji="0" normalizeH="0">
+          <a:defRPr kumimoji="0" sz="1800" b="0" i="0" u="none" strike="noStrike" cap="none" spc="0" normalizeH="0" baseline="0">
             <a:ln>
               <a:noFill/>
             </a:ln>
@@ -6991,7 +6832,7 @@
           <a:buFontTx/>
           <a:buNone/>
           <a:tabLst/>
-          <a:defRPr b="0" baseline="0" cap="none" i="0" spc="0" strike="noStrike" sz="1800" u="none" kumimoji="0" normalizeH="0">
+          <a:defRPr kumimoji="0" sz="1800" b="0" i="0" u="none" strike="noStrike" cap="none" spc="0" normalizeH="0" baseline="0">
             <a:ln>
               <a:noFill/>
             </a:ln>
@@ -7017,7 +6858,7 @@
           <a:buFontTx/>
           <a:buNone/>
           <a:tabLst/>
-          <a:defRPr b="0" baseline="0" cap="none" i="0" spc="0" strike="noStrike" sz="1800" u="none" kumimoji="0" normalizeH="0">
+          <a:defRPr kumimoji="0" sz="1800" b="0" i="0" u="none" strike="noStrike" cap="none" spc="0" normalizeH="0" baseline="0">
             <a:ln>
               <a:noFill/>
             </a:ln>
@@ -7043,7 +6884,7 @@
           <a:buFontTx/>
           <a:buNone/>
           <a:tabLst/>
-          <a:defRPr b="0" baseline="0" cap="none" i="0" spc="0" strike="noStrike" sz="1800" u="none" kumimoji="0" normalizeH="0">
+          <a:defRPr kumimoji="0" sz="1800" b="0" i="0" u="none" strike="noStrike" cap="none" spc="0" normalizeH="0" baseline="0">
             <a:ln>
               <a:noFill/>
             </a:ln>
@@ -7069,7 +6910,7 @@
           <a:buFontTx/>
           <a:buNone/>
           <a:tabLst/>
-          <a:defRPr b="0" baseline="0" cap="none" i="0" spc="0" strike="noStrike" sz="1800" u="none" kumimoji="0" normalizeH="0">
+          <a:defRPr kumimoji="0" sz="1800" b="0" i="0" u="none" strike="noStrike" cap="none" spc="0" normalizeH="0" baseline="0">
             <a:ln>
               <a:noFill/>
             </a:ln>
@@ -7082,9 +6923,15 @@
         </a:lvl9pPr>
       </a:lstStyle>
       <a:style>
-        <a:lnRef idx="0"/>
-        <a:fillRef idx="0"/>
-        <a:effectRef idx="0"/>
+        <a:lnRef idx="0">
+          <a:scrgbClr r="0" g="0" b="0"/>
+        </a:lnRef>
+        <a:fillRef idx="0">
+          <a:scrgbClr r="0" g="0" b="0"/>
+        </a:fillRef>
+        <a:effectRef idx="0">
+          <a:scrgbClr r="0" g="0" b="0"/>
+        </a:effectRef>
         <a:fontRef idx="none"/>
       </a:style>
     </a:lnDef>
@@ -7098,7 +6945,7 @@
         <a:effectLst/>
         <a:sp3d/>
       </a:spPr>
-      <a:bodyPr rot="0" spcFirstLastPara="1" vertOverflow="overflow" horzOverflow="overflow" vert="horz" wrap="square" lIns="45719" tIns="45719" rIns="45719" bIns="45719" numCol="1" spcCol="38100" rtlCol="0" anchor="t" upright="0">
+      <a:bodyPr rot="0" spcFirstLastPara="1" vertOverflow="overflow" horzOverflow="overflow" vert="horz" wrap="square" lIns="45719" tIns="45719" rIns="45719" bIns="45719" numCol="1" spcCol="38100" rtlCol="0" anchor="t">
         <a:spAutoFit/>
       </a:bodyPr>
       <a:lstStyle>
@@ -7117,7 +6964,7 @@
           <a:buFontTx/>
           <a:buNone/>
           <a:tabLst/>
-          <a:defRPr b="0" baseline="0" cap="none" i="0" spc="0" strike="noStrike" sz="1800" u="none" kumimoji="0" normalizeH="0">
+          <a:defRPr kumimoji="0" sz="1800" b="0" i="0" u="none" strike="noStrike" cap="none" spc="0" normalizeH="0" baseline="0">
             <a:ln>
               <a:noFill/>
             </a:ln>
@@ -7147,7 +6994,7 @@
           <a:buFontTx/>
           <a:buNone/>
           <a:tabLst/>
-          <a:defRPr b="0" baseline="0" cap="none" i="0" spc="0" strike="noStrike" sz="1800" u="none" kumimoji="0" normalizeH="0">
+          <a:defRPr kumimoji="0" sz="1800" b="0" i="0" u="none" strike="noStrike" cap="none" spc="0" normalizeH="0" baseline="0">
             <a:ln>
               <a:noFill/>
             </a:ln>
@@ -7173,7 +7020,7 @@
           <a:buFontTx/>
           <a:buNone/>
           <a:tabLst/>
-          <a:defRPr b="0" baseline="0" cap="none" i="0" spc="0" strike="noStrike" sz="1800" u="none" kumimoji="0" normalizeH="0">
+          <a:defRPr kumimoji="0" sz="1800" b="0" i="0" u="none" strike="noStrike" cap="none" spc="0" normalizeH="0" baseline="0">
             <a:ln>
               <a:noFill/>
             </a:ln>
@@ -7199,7 +7046,7 @@
           <a:buFontTx/>
           <a:buNone/>
           <a:tabLst/>
-          <a:defRPr b="0" baseline="0" cap="none" i="0" spc="0" strike="noStrike" sz="1800" u="none" kumimoji="0" normalizeH="0">
+          <a:defRPr kumimoji="0" sz="1800" b="0" i="0" u="none" strike="noStrike" cap="none" spc="0" normalizeH="0" baseline="0">
             <a:ln>
               <a:noFill/>
             </a:ln>
@@ -7225,7 +7072,7 @@
           <a:buFontTx/>
           <a:buNone/>
           <a:tabLst/>
-          <a:defRPr b="0" baseline="0" cap="none" i="0" spc="0" strike="noStrike" sz="1800" u="none" kumimoji="0" normalizeH="0">
+          <a:defRPr kumimoji="0" sz="1800" b="0" i="0" u="none" strike="noStrike" cap="none" spc="0" normalizeH="0" baseline="0">
             <a:ln>
               <a:noFill/>
             </a:ln>
@@ -7251,7 +7098,7 @@
           <a:buFontTx/>
           <a:buNone/>
           <a:tabLst/>
-          <a:defRPr b="0" baseline="0" cap="none" i="0" spc="0" strike="noStrike" sz="1800" u="none" kumimoji="0" normalizeH="0">
+          <a:defRPr kumimoji="0" sz="1800" b="0" i="0" u="none" strike="noStrike" cap="none" spc="0" normalizeH="0" baseline="0">
             <a:ln>
               <a:noFill/>
             </a:ln>
@@ -7277,7 +7124,7 @@
           <a:buFontTx/>
           <a:buNone/>
           <a:tabLst/>
-          <a:defRPr b="0" baseline="0" cap="none" i="0" spc="0" strike="noStrike" sz="1800" u="none" kumimoji="0" normalizeH="0">
+          <a:defRPr kumimoji="0" sz="1800" b="0" i="0" u="none" strike="noStrike" cap="none" spc="0" normalizeH="0" baseline="0">
             <a:ln>
               <a:noFill/>
             </a:ln>
@@ -7303,7 +7150,7 @@
           <a:buFontTx/>
           <a:buNone/>
           <a:tabLst/>
-          <a:defRPr b="0" baseline="0" cap="none" i="0" spc="0" strike="noStrike" sz="1800" u="none" kumimoji="0" normalizeH="0">
+          <a:defRPr kumimoji="0" sz="1800" b="0" i="0" u="none" strike="noStrike" cap="none" spc="0" normalizeH="0" baseline="0">
             <a:ln>
               <a:noFill/>
             </a:ln>
@@ -7329,7 +7176,7 @@
           <a:buFontTx/>
           <a:buNone/>
           <a:tabLst/>
-          <a:defRPr b="0" baseline="0" cap="none" i="0" spc="0" strike="noStrike" sz="1800" u="none" kumimoji="0" normalizeH="0">
+          <a:defRPr kumimoji="0" sz="1800" b="0" i="0" u="none" strike="noStrike" cap="none" spc="0" normalizeH="0" baseline="0">
             <a:ln>
               <a:noFill/>
             </a:ln>
@@ -7355,7 +7202,7 @@
           <a:buFontTx/>
           <a:buNone/>
           <a:tabLst/>
-          <a:defRPr b="0" baseline="0" cap="none" i="0" spc="0" strike="noStrike" sz="1800" u="none" kumimoji="0" normalizeH="0">
+          <a:defRPr kumimoji="0" sz="1800" b="0" i="0" u="none" strike="noStrike" cap="none" spc="0" normalizeH="0" baseline="0">
             <a:ln>
               <a:noFill/>
             </a:ln>
@@ -7368,18 +7215,25 @@
         </a:lvl9pPr>
       </a:lstStyle>
       <a:style>
-        <a:lnRef idx="0"/>
-        <a:fillRef idx="0"/>
-        <a:effectRef idx="0"/>
+        <a:lnRef idx="0">
+          <a:scrgbClr r="0" g="0" b="0"/>
+        </a:lnRef>
+        <a:fillRef idx="0">
+          <a:scrgbClr r="0" g="0" b="0"/>
+        </a:fillRef>
+        <a:effectRef idx="0">
+          <a:scrgbClr r="0" g="0" b="0"/>
+        </a:effectRef>
         <a:fontRef idx="none"/>
       </a:style>
     </a:txDef>
   </a:objectDefaults>
+  <a:extraClrSchemeLst/>
 </a:theme>
 </file>
 
 <file path=ppt/theme/theme2.xml><?xml version="1.0" encoding="utf-8"?>
-<a:theme xmlns:a="http://schemas.openxmlformats.org/drawingml/2006/main" xmlns:r="http://schemas.openxmlformats.org/officeDocument/2006/relationships" name="Office Theme">
+<a:theme xmlns:a="http://schemas.openxmlformats.org/drawingml/2006/main" name="Office Theme">
   <a:themeElements>
     <a:clrScheme name="Office Theme">
       <a:dk1>
@@ -7505,7 +7359,7 @@
       <a:effectStyleLst>
         <a:effectStyle>
           <a:effectLst>
-            <a:outerShdw sx="100000" sy="100000" kx="0" ky="0" algn="b" rotWithShape="0" blurRad="38100" dist="23000" dir="5400000">
+            <a:outerShdw blurRad="38100" dist="23000" dir="5400000" rotWithShape="0">
               <a:srgbClr val="000000">
                 <a:alpha val="35000"/>
               </a:srgbClr>
@@ -7514,7 +7368,7 @@
         </a:effectStyle>
         <a:effectStyle>
           <a:effectLst>
-            <a:outerShdw sx="100000" sy="100000" kx="0" ky="0" algn="b" rotWithShape="0" blurRad="38100" dist="23000" dir="5400000">
+            <a:outerShdw blurRad="38100" dist="23000" dir="5400000" rotWithShape="0">
               <a:srgbClr val="000000">
                 <a:alpha val="35000"/>
               </a:srgbClr>
@@ -7523,7 +7377,7 @@
         </a:effectStyle>
         <a:effectStyle>
           <a:effectLst>
-            <a:outerShdw sx="100000" sy="100000" kx="0" ky="0" algn="b" rotWithShape="0" blurRad="38100" dist="20000" dir="5400000">
+            <a:outerShdw blurRad="38100" dist="20000" dir="5400000" rotWithShape="0">
               <a:srgbClr val="000000">
                 <a:alpha val="38000"/>
               </a:srgbClr>
@@ -7597,7 +7451,7 @@
           <a:round/>
         </a:ln>
         <a:effectLst>
-          <a:outerShdw sx="100000" sy="100000" kx="0" ky="0" algn="b" rotWithShape="0" blurRad="38100" dist="23000" dir="5400000">
+          <a:outerShdw blurRad="38100" dist="23000" dir="5400000" rotWithShape="0">
             <a:srgbClr val="000000">
               <a:alpha val="35000"/>
             </a:srgbClr>
@@ -7605,7 +7459,7 @@
         </a:effectLst>
         <a:sp3d/>
       </a:spPr>
-      <a:bodyPr rot="0" spcFirstLastPara="1" vertOverflow="overflow" horzOverflow="overflow" vert="horz" wrap="square" lIns="45719" tIns="45719" rIns="45719" bIns="45719" numCol="1" spcCol="38100" rtlCol="0" anchor="ctr" upright="0">
+      <a:bodyPr rot="0" spcFirstLastPara="1" vertOverflow="overflow" horzOverflow="overflow" vert="horz" wrap="square" lIns="45719" tIns="45719" rIns="45719" bIns="45719" numCol="1" spcCol="38100" rtlCol="0" anchor="ctr">
         <a:spAutoFit/>
       </a:bodyPr>
       <a:lstStyle>
@@ -7624,7 +7478,7 @@
           <a:buFontTx/>
           <a:buNone/>
           <a:tabLst/>
-          <a:defRPr b="0" baseline="0" cap="none" i="0" spc="0" strike="noStrike" sz="1800" u="none" kumimoji="0" normalizeH="0">
+          <a:defRPr kumimoji="0" sz="1800" b="0" i="0" u="none" strike="noStrike" cap="none" spc="0" normalizeH="0" baseline="0">
             <a:ln>
               <a:noFill/>
             </a:ln>
@@ -7654,7 +7508,7 @@
           <a:buFontTx/>
           <a:buNone/>
           <a:tabLst/>
-          <a:defRPr b="0" baseline="0" cap="none" i="0" spc="0" strike="noStrike" sz="1800" u="none" kumimoji="0" normalizeH="0">
+          <a:defRPr kumimoji="0" sz="1800" b="0" i="0" u="none" strike="noStrike" cap="none" spc="0" normalizeH="0" baseline="0">
             <a:ln>
               <a:noFill/>
             </a:ln>
@@ -7680,7 +7534,7 @@
           <a:buFontTx/>
           <a:buNone/>
           <a:tabLst/>
-          <a:defRPr b="0" baseline="0" cap="none" i="0" spc="0" strike="noStrike" sz="1800" u="none" kumimoji="0" normalizeH="0">
+          <a:defRPr kumimoji="0" sz="1800" b="0" i="0" u="none" strike="noStrike" cap="none" spc="0" normalizeH="0" baseline="0">
             <a:ln>
               <a:noFill/>
             </a:ln>
@@ -7706,7 +7560,7 @@
           <a:buFontTx/>
           <a:buNone/>
           <a:tabLst/>
-          <a:defRPr b="0" baseline="0" cap="none" i="0" spc="0" strike="noStrike" sz="1800" u="none" kumimoji="0" normalizeH="0">
+          <a:defRPr kumimoji="0" sz="1800" b="0" i="0" u="none" strike="noStrike" cap="none" spc="0" normalizeH="0" baseline="0">
             <a:ln>
               <a:noFill/>
             </a:ln>
@@ -7732,7 +7586,7 @@
           <a:buFontTx/>
           <a:buNone/>
           <a:tabLst/>
-          <a:defRPr b="0" baseline="0" cap="none" i="0" spc="0" strike="noStrike" sz="1800" u="none" kumimoji="0" normalizeH="0">
+          <a:defRPr kumimoji="0" sz="1800" b="0" i="0" u="none" strike="noStrike" cap="none" spc="0" normalizeH="0" baseline="0">
             <a:ln>
               <a:noFill/>
             </a:ln>
@@ -7758,7 +7612,7 @@
           <a:buFontTx/>
           <a:buNone/>
           <a:tabLst/>
-          <a:defRPr b="0" baseline="0" cap="none" i="0" spc="0" strike="noStrike" sz="1800" u="none" kumimoji="0" normalizeH="0">
+          <a:defRPr kumimoji="0" sz="1800" b="0" i="0" u="none" strike="noStrike" cap="none" spc="0" normalizeH="0" baseline="0">
             <a:ln>
               <a:noFill/>
             </a:ln>
@@ -7784,7 +7638,7 @@
           <a:buFontTx/>
           <a:buNone/>
           <a:tabLst/>
-          <a:defRPr b="0" baseline="0" cap="none" i="0" spc="0" strike="noStrike" sz="1800" u="none" kumimoji="0" normalizeH="0">
+          <a:defRPr kumimoji="0" sz="1800" b="0" i="0" u="none" strike="noStrike" cap="none" spc="0" normalizeH="0" baseline="0">
             <a:ln>
               <a:noFill/>
             </a:ln>
@@ -7810,7 +7664,7 @@
           <a:buFontTx/>
           <a:buNone/>
           <a:tabLst/>
-          <a:defRPr b="0" baseline="0" cap="none" i="0" spc="0" strike="noStrike" sz="1800" u="none" kumimoji="0" normalizeH="0">
+          <a:defRPr kumimoji="0" sz="1800" b="0" i="0" u="none" strike="noStrike" cap="none" spc="0" normalizeH="0" baseline="0">
             <a:ln>
               <a:noFill/>
             </a:ln>
@@ -7836,7 +7690,7 @@
           <a:buFontTx/>
           <a:buNone/>
           <a:tabLst/>
-          <a:defRPr b="0" baseline="0" cap="none" i="0" spc="0" strike="noStrike" sz="1800" u="none" kumimoji="0" normalizeH="0">
+          <a:defRPr kumimoji="0" sz="1800" b="0" i="0" u="none" strike="noStrike" cap="none" spc="0" normalizeH="0" baseline="0">
             <a:ln>
               <a:noFill/>
             </a:ln>
@@ -7862,7 +7716,7 @@
           <a:buFontTx/>
           <a:buNone/>
           <a:tabLst/>
-          <a:defRPr b="0" baseline="0" cap="none" i="0" spc="0" strike="noStrike" sz="1800" u="none" kumimoji="0" normalizeH="0">
+          <a:defRPr kumimoji="0" sz="1800" b="0" i="0" u="none" strike="noStrike" cap="none" spc="0" normalizeH="0" baseline="0">
             <a:ln>
               <a:noFill/>
             </a:ln>
@@ -7875,9 +7729,15 @@
         </a:lvl9pPr>
       </a:lstStyle>
       <a:style>
-        <a:lnRef idx="0"/>
-        <a:fillRef idx="0"/>
-        <a:effectRef idx="0"/>
+        <a:lnRef idx="0">
+          <a:scrgbClr r="0" g="0" b="0"/>
+        </a:lnRef>
+        <a:fillRef idx="0">
+          <a:scrgbClr r="0" g="0" b="0"/>
+        </a:fillRef>
+        <a:effectRef idx="0">
+          <a:scrgbClr r="0" g="0" b="0"/>
+        </a:effectRef>
         <a:fontRef idx="none"/>
       </a:style>
     </a:spDef>
@@ -7892,7 +7752,7 @@
           <a:round/>
         </a:ln>
         <a:effectLst>
-          <a:outerShdw sx="100000" sy="100000" kx="0" ky="0" algn="b" rotWithShape="0" blurRad="38100" dist="20000" dir="5400000">
+          <a:outerShdw blurRad="38100" dist="20000" dir="5400000" rotWithShape="0">
             <a:srgbClr val="000000">
               <a:alpha val="38000"/>
             </a:srgbClr>
@@ -7900,7 +7760,7 @@
         </a:effectLst>
         <a:sp3d/>
       </a:spPr>
-      <a:bodyPr rot="0" spcFirstLastPara="1" vertOverflow="overflow" horzOverflow="overflow" vert="horz" wrap="square" lIns="91439" tIns="45719" rIns="91439" bIns="45719" numCol="1" spcCol="38100" rtlCol="0" anchor="t" upright="0">
+      <a:bodyPr rot="0" spcFirstLastPara="1" vertOverflow="overflow" horzOverflow="overflow" vert="horz" wrap="square" lIns="91439" tIns="45719" rIns="91439" bIns="45719" numCol="1" spcCol="38100" rtlCol="0" anchor="t">
         <a:noAutofit/>
       </a:bodyPr>
       <a:lstStyle>
@@ -7919,7 +7779,7 @@
           <a:buFontTx/>
           <a:buNone/>
           <a:tabLst/>
-          <a:defRPr b="0" baseline="0" cap="none" i="0" spc="0" strike="noStrike" sz="1800" u="none" kumimoji="0" normalizeH="0">
+          <a:defRPr kumimoji="0" sz="1800" b="0" i="0" u="none" strike="noStrike" cap="none" spc="0" normalizeH="0" baseline="0">
             <a:ln>
               <a:noFill/>
             </a:ln>
@@ -7945,7 +7805,7 @@
           <a:buFontTx/>
           <a:buNone/>
           <a:tabLst/>
-          <a:defRPr b="0" baseline="0" cap="none" i="0" spc="0" strike="noStrike" sz="1800" u="none" kumimoji="0" normalizeH="0">
+          <a:defRPr kumimoji="0" sz="1800" b="0" i="0" u="none" strike="noStrike" cap="none" spc="0" normalizeH="0" baseline="0">
             <a:ln>
               <a:noFill/>
             </a:ln>
@@ -7971,7 +7831,7 @@
           <a:buFontTx/>
           <a:buNone/>
           <a:tabLst/>
-          <a:defRPr b="0" baseline="0" cap="none" i="0" spc="0" strike="noStrike" sz="1800" u="none" kumimoji="0" normalizeH="0">
+          <a:defRPr kumimoji="0" sz="1800" b="0" i="0" u="none" strike="noStrike" cap="none" spc="0" normalizeH="0" baseline="0">
             <a:ln>
               <a:noFill/>
             </a:ln>
@@ -7997,7 +7857,7 @@
           <a:buFontTx/>
           <a:buNone/>
           <a:tabLst/>
-          <a:defRPr b="0" baseline="0" cap="none" i="0" spc="0" strike="noStrike" sz="1800" u="none" kumimoji="0" normalizeH="0">
+          <a:defRPr kumimoji="0" sz="1800" b="0" i="0" u="none" strike="noStrike" cap="none" spc="0" normalizeH="0" baseline="0">
             <a:ln>
               <a:noFill/>
             </a:ln>
@@ -8023,7 +7883,7 @@
           <a:buFontTx/>
           <a:buNone/>
           <a:tabLst/>
-          <a:defRPr b="0" baseline="0" cap="none" i="0" spc="0" strike="noStrike" sz="1800" u="none" kumimoji="0" normalizeH="0">
+          <a:defRPr kumimoji="0" sz="1800" b="0" i="0" u="none" strike="noStrike" cap="none" spc="0" normalizeH="0" baseline="0">
             <a:ln>
               <a:noFill/>
             </a:ln>
@@ -8049,7 +7909,7 @@
           <a:buFontTx/>
           <a:buNone/>
           <a:tabLst/>
-          <a:defRPr b="0" baseline="0" cap="none" i="0" spc="0" strike="noStrike" sz="1800" u="none" kumimoji="0" normalizeH="0">
+          <a:defRPr kumimoji="0" sz="1800" b="0" i="0" u="none" strike="noStrike" cap="none" spc="0" normalizeH="0" baseline="0">
             <a:ln>
               <a:noFill/>
             </a:ln>
@@ -8075,7 +7935,7 @@
           <a:buFontTx/>
           <a:buNone/>
           <a:tabLst/>
-          <a:defRPr b="0" baseline="0" cap="none" i="0" spc="0" strike="noStrike" sz="1800" u="none" kumimoji="0" normalizeH="0">
+          <a:defRPr kumimoji="0" sz="1800" b="0" i="0" u="none" strike="noStrike" cap="none" spc="0" normalizeH="0" baseline="0">
             <a:ln>
               <a:noFill/>
             </a:ln>
@@ -8101,7 +7961,7 @@
           <a:buFontTx/>
           <a:buNone/>
           <a:tabLst/>
-          <a:defRPr b="0" baseline="0" cap="none" i="0" spc="0" strike="noStrike" sz="1800" u="none" kumimoji="0" normalizeH="0">
+          <a:defRPr kumimoji="0" sz="1800" b="0" i="0" u="none" strike="noStrike" cap="none" spc="0" normalizeH="0" baseline="0">
             <a:ln>
               <a:noFill/>
             </a:ln>
@@ -8127,7 +7987,7 @@
           <a:buFontTx/>
           <a:buNone/>
           <a:tabLst/>
-          <a:defRPr b="0" baseline="0" cap="none" i="0" spc="0" strike="noStrike" sz="1800" u="none" kumimoji="0" normalizeH="0">
+          <a:defRPr kumimoji="0" sz="1800" b="0" i="0" u="none" strike="noStrike" cap="none" spc="0" normalizeH="0" baseline="0">
             <a:ln>
               <a:noFill/>
             </a:ln>
@@ -8153,7 +8013,7 @@
           <a:buFontTx/>
           <a:buNone/>
           <a:tabLst/>
-          <a:defRPr b="0" baseline="0" cap="none" i="0" spc="0" strike="noStrike" sz="1800" u="none" kumimoji="0" normalizeH="0">
+          <a:defRPr kumimoji="0" sz="1800" b="0" i="0" u="none" strike="noStrike" cap="none" spc="0" normalizeH="0" baseline="0">
             <a:ln>
               <a:noFill/>
             </a:ln>
@@ -8166,9 +8026,15 @@
         </a:lvl9pPr>
       </a:lstStyle>
       <a:style>
-        <a:lnRef idx="0"/>
-        <a:fillRef idx="0"/>
-        <a:effectRef idx="0"/>
+        <a:lnRef idx="0">
+          <a:scrgbClr r="0" g="0" b="0"/>
+        </a:lnRef>
+        <a:fillRef idx="0">
+          <a:scrgbClr r="0" g="0" b="0"/>
+        </a:fillRef>
+        <a:effectRef idx="0">
+          <a:scrgbClr r="0" g="0" b="0"/>
+        </a:effectRef>
         <a:fontRef idx="none"/>
       </a:style>
     </a:lnDef>
@@ -8182,7 +8048,7 @@
         <a:effectLst/>
         <a:sp3d/>
       </a:spPr>
-      <a:bodyPr rot="0" spcFirstLastPara="1" vertOverflow="overflow" horzOverflow="overflow" vert="horz" wrap="square" lIns="45719" tIns="45719" rIns="45719" bIns="45719" numCol="1" spcCol="38100" rtlCol="0" anchor="t" upright="0">
+      <a:bodyPr rot="0" spcFirstLastPara="1" vertOverflow="overflow" horzOverflow="overflow" vert="horz" wrap="square" lIns="45719" tIns="45719" rIns="45719" bIns="45719" numCol="1" spcCol="38100" rtlCol="0" anchor="t">
         <a:spAutoFit/>
       </a:bodyPr>
       <a:lstStyle>
@@ -8201,7 +8067,7 @@
           <a:buFontTx/>
           <a:buNone/>
           <a:tabLst/>
-          <a:defRPr b="0" baseline="0" cap="none" i="0" spc="0" strike="noStrike" sz="1800" u="none" kumimoji="0" normalizeH="0">
+          <a:defRPr kumimoji="0" sz="1800" b="0" i="0" u="none" strike="noStrike" cap="none" spc="0" normalizeH="0" baseline="0">
             <a:ln>
               <a:noFill/>
             </a:ln>
@@ -8231,7 +8097,7 @@
           <a:buFontTx/>
           <a:buNone/>
           <a:tabLst/>
-          <a:defRPr b="0" baseline="0" cap="none" i="0" spc="0" strike="noStrike" sz="1800" u="none" kumimoji="0" normalizeH="0">
+          <a:defRPr kumimoji="0" sz="1800" b="0" i="0" u="none" strike="noStrike" cap="none" spc="0" normalizeH="0" baseline="0">
             <a:ln>
               <a:noFill/>
             </a:ln>
@@ -8257,7 +8123,7 @@
           <a:buFontTx/>
           <a:buNone/>
           <a:tabLst/>
-          <a:defRPr b="0" baseline="0" cap="none" i="0" spc="0" strike="noStrike" sz="1800" u="none" kumimoji="0" normalizeH="0">
+          <a:defRPr kumimoji="0" sz="1800" b="0" i="0" u="none" strike="noStrike" cap="none" spc="0" normalizeH="0" baseline="0">
             <a:ln>
               <a:noFill/>
             </a:ln>
@@ -8283,7 +8149,7 @@
           <a:buFontTx/>
           <a:buNone/>
           <a:tabLst/>
-          <a:defRPr b="0" baseline="0" cap="none" i="0" spc="0" strike="noStrike" sz="1800" u="none" kumimoji="0" normalizeH="0">
+          <a:defRPr kumimoji="0" sz="1800" b="0" i="0" u="none" strike="noStrike" cap="none" spc="0" normalizeH="0" baseline="0">
             <a:ln>
               <a:noFill/>
             </a:ln>
@@ -8309,7 +8175,7 @@
           <a:buFontTx/>
           <a:buNone/>
           <a:tabLst/>
-          <a:defRPr b="0" baseline="0" cap="none" i="0" spc="0" strike="noStrike" sz="1800" u="none" kumimoji="0" normalizeH="0">
+          <a:defRPr kumimoji="0" sz="1800" b="0" i="0" u="none" strike="noStrike" cap="none" spc="0" normalizeH="0" baseline="0">
             <a:ln>
               <a:noFill/>
             </a:ln>
@@ -8335,7 +8201,7 @@
           <a:buFontTx/>
           <a:buNone/>
           <a:tabLst/>
-          <a:defRPr b="0" baseline="0" cap="none" i="0" spc="0" strike="noStrike" sz="1800" u="none" kumimoji="0" normalizeH="0">
+          <a:defRPr kumimoji="0" sz="1800" b="0" i="0" u="none" strike="noStrike" cap="none" spc="0" normalizeH="0" baseline="0">
             <a:ln>
               <a:noFill/>
             </a:ln>
@@ -8361,7 +8227,7 @@
           <a:buFontTx/>
           <a:buNone/>
           <a:tabLst/>
-          <a:defRPr b="0" baseline="0" cap="none" i="0" spc="0" strike="noStrike" sz="1800" u="none" kumimoji="0" normalizeH="0">
+          <a:defRPr kumimoji="0" sz="1800" b="0" i="0" u="none" strike="noStrike" cap="none" spc="0" normalizeH="0" baseline="0">
             <a:ln>
               <a:noFill/>
             </a:ln>
@@ -8387,7 +8253,7 @@
           <a:buFontTx/>
           <a:buNone/>
           <a:tabLst/>
-          <a:defRPr b="0" baseline="0" cap="none" i="0" spc="0" strike="noStrike" sz="1800" u="none" kumimoji="0" normalizeH="0">
+          <a:defRPr kumimoji="0" sz="1800" b="0" i="0" u="none" strike="noStrike" cap="none" spc="0" normalizeH="0" baseline="0">
             <a:ln>
               <a:noFill/>
             </a:ln>
@@ -8413,7 +8279,7 @@
           <a:buFontTx/>
           <a:buNone/>
           <a:tabLst/>
-          <a:defRPr b="0" baseline="0" cap="none" i="0" spc="0" strike="noStrike" sz="1800" u="none" kumimoji="0" normalizeH="0">
+          <a:defRPr kumimoji="0" sz="1800" b="0" i="0" u="none" strike="noStrike" cap="none" spc="0" normalizeH="0" baseline="0">
             <a:ln>
               <a:noFill/>
             </a:ln>
@@ -8439,7 +8305,7 @@
           <a:buFontTx/>
           <a:buNone/>
           <a:tabLst/>
-          <a:defRPr b="0" baseline="0" cap="none" i="0" spc="0" strike="noStrike" sz="1800" u="none" kumimoji="0" normalizeH="0">
+          <a:defRPr kumimoji="0" sz="1800" b="0" i="0" u="none" strike="noStrike" cap="none" spc="0" normalizeH="0" baseline="0">
             <a:ln>
               <a:noFill/>
             </a:ln>
@@ -8452,12 +8318,19 @@
         </a:lvl9pPr>
       </a:lstStyle>
       <a:style>
-        <a:lnRef idx="0"/>
-        <a:fillRef idx="0"/>
-        <a:effectRef idx="0"/>
+        <a:lnRef idx="0">
+          <a:scrgbClr r="0" g="0" b="0"/>
+        </a:lnRef>
+        <a:fillRef idx="0">
+          <a:scrgbClr r="0" g="0" b="0"/>
+        </a:fillRef>
+        <a:effectRef idx="0">
+          <a:scrgbClr r="0" g="0" b="0"/>
+        </a:effectRef>
         <a:fontRef idx="none"/>
       </a:style>
     </a:txDef>
   </a:objectDefaults>
+  <a:extraClrSchemeLst/>
 </a:theme>
 </file>
</xml_diff>